<commit_message>
Adding files and visuals for project and updated the ReadMe
</commit_message>
<xml_diff>
--- a/Segment 2/Colorado Basin River Analysis.pptx
+++ b/Segment 2/Colorado Basin River Analysis.pptx
@@ -15,6 +15,9 @@
     <p:sldId id="259" r:id="rId10"/>
     <p:sldId id="260" r:id="rId11"/>
     <p:sldId id="261" r:id="rId12"/>
+    <p:sldId id="262" r:id="rId13"/>
+    <p:sldId id="263" r:id="rId14"/>
+    <p:sldId id="264" r:id="rId15"/>
   </p:sldIdLst>
   <p:sldSz cy="5143500" cx="9144000"/>
   <p:notesSz cx="6858000" cy="9144000"/>
@@ -1008,7 +1011,7 @@
       </p:grpSpPr>
       <p:sp>
         <p:nvSpPr>
-          <p:cNvPr id="153" name="Google Shape;153;g20c84e7f2c4_1_5:notes"/>
+          <p:cNvPr id="153" name="Google Shape;153;g20c8cc39a64_0_31:notes"/>
           <p:cNvSpPr txBox="1"/>
           <p:nvPr>
             <p:ph idx="1" type="body"/>
@@ -1047,7 +1050,7 @@
       </p:sp>
       <p:sp>
         <p:nvSpPr>
-          <p:cNvPr id="154" name="Google Shape;154;g20c84e7f2c4_1_5:notes"/>
+          <p:cNvPr id="154" name="Google Shape;154;g20c8cc39a64_0_31:notes"/>
           <p:cNvSpPr/>
           <p:nvPr>
             <p:ph idx="2" type="sldImg"/>
@@ -1107,7 +1110,304 @@
       </p:grpSpPr>
       <p:sp>
         <p:nvSpPr>
-          <p:cNvPr id="162" name="Google Shape;162;g20c84e7f2c4_1_0:notes"/>
+          <p:cNvPr id="162" name="Google Shape;162;g20c8cc39a64_0_13:notes"/>
+          <p:cNvSpPr txBox="1"/>
+          <p:nvPr>
+            <p:ph idx="1" type="body"/>
+          </p:nvPr>
+        </p:nvSpPr>
+        <p:spPr>
+          <a:xfrm>
+            <a:off x="685800" y="4343400"/>
+            <a:ext cx="5486400" cy="4114800"/>
+          </a:xfrm>
+          <a:prstGeom prst="rect">
+            <a:avLst/>
+          </a:prstGeom>
+        </p:spPr>
+        <p:txBody>
+          <a:bodyPr anchorCtr="0" anchor="t" bIns="91425" lIns="91425" spcFirstLastPara="1" rIns="91425" wrap="square" tIns="91425">
+            <a:noAutofit/>
+          </a:bodyPr>
+          <a:lstStyle/>
+          <a:p>
+            <a:pPr indent="0" lvl="0" marL="0" rtl="0" algn="l">
+              <a:spcBef>
+                <a:spcPts val="0"/>
+              </a:spcBef>
+              <a:spcAft>
+                <a:spcPts val="0"/>
+              </a:spcAft>
+              <a:buNone/>
+            </a:pPr>
+            <a:r>
+              <a:t/>
+            </a:r>
+            <a:endParaRPr/>
+          </a:p>
+        </p:txBody>
+      </p:sp>
+      <p:sp>
+        <p:nvSpPr>
+          <p:cNvPr id="163" name="Google Shape;163;g20c8cc39a64_0_13:notes"/>
+          <p:cNvSpPr/>
+          <p:nvPr>
+            <p:ph idx="2" type="sldImg"/>
+          </p:nvPr>
+        </p:nvSpPr>
+        <p:spPr>
+          <a:xfrm>
+            <a:off x="1143225" y="685800"/>
+            <a:ext cx="4572300" cy="3429000"/>
+          </a:xfrm>
+          <a:custGeom>
+            <a:rect b="b" l="l" r="r" t="t"/>
+            <a:pathLst>
+              <a:path extrusionOk="0" h="120000" w="120000">
+                <a:moveTo>
+                  <a:pt x="0" y="0"/>
+                </a:moveTo>
+                <a:lnTo>
+                  <a:pt x="120000" y="0"/>
+                </a:lnTo>
+                <a:lnTo>
+                  <a:pt x="120000" y="120000"/>
+                </a:lnTo>
+                <a:lnTo>
+                  <a:pt x="0" y="120000"/>
+                </a:lnTo>
+                <a:close/>
+              </a:path>
+            </a:pathLst>
+          </a:custGeom>
+        </p:spPr>
+      </p:sp>
+    </p:spTree>
+  </p:cSld>
+  <p:clrMapOvr>
+    <a:masterClrMapping/>
+  </p:clrMapOvr>
+</p:notes>
+</file>
+
+<file path=ppt/notesSlides/notesSlide6.xml><?xml version="1.0" encoding="utf-8"?>
+<p:notes xmlns:a="http://schemas.openxmlformats.org/drawingml/2006/main" xmlns:r="http://schemas.openxmlformats.org/officeDocument/2006/relationships" xmlns:mc="http://schemas.openxmlformats.org/markup-compatibility/2006" xmlns:mv="urn:schemas-microsoft-com:mac:vml" xmlns:p="http://schemas.openxmlformats.org/presentationml/2006/main" xmlns:c="http://schemas.openxmlformats.org/drawingml/2006/chart" xmlns:dgm="http://schemas.openxmlformats.org/drawingml/2006/diagram" xmlns:o="urn:schemas-microsoft-com:office:office" xmlns:v="urn:schemas-microsoft-com:vml" xmlns:pvml="urn:schemas-microsoft-com:office:powerpoint" xmlns:com="http://schemas.openxmlformats.org/drawingml/2006/compatibility" xmlns:p14="http://schemas.microsoft.com/office/powerpoint/2010/main" xmlns:p15="http://schemas.microsoft.com/office/powerpoint/2012/main" xmlns:ahyp="http://schemas.microsoft.com/office/drawing/2018/hyperlinkcolor" showMasterPhAnim="0" showMasterSp="0">
+  <p:cSld>
+    <p:spTree>
+      <p:nvGrpSpPr>
+        <p:cNvPr id="170" name="Shape 170"/>
+        <p:cNvGrpSpPr/>
+        <p:nvPr/>
+      </p:nvGrpSpPr>
+      <p:grpSpPr>
+        <a:xfrm>
+          <a:off x="0" y="0"/>
+          <a:ext cx="0" cy="0"/>
+          <a:chOff x="0" y="0"/>
+          <a:chExt cx="0" cy="0"/>
+        </a:xfrm>
+      </p:grpSpPr>
+      <p:sp>
+        <p:nvSpPr>
+          <p:cNvPr id="171" name="Google Shape;171;g20c8cc39a64_0_0:notes"/>
+          <p:cNvSpPr txBox="1"/>
+          <p:nvPr>
+            <p:ph idx="1" type="body"/>
+          </p:nvPr>
+        </p:nvSpPr>
+        <p:spPr>
+          <a:xfrm>
+            <a:off x="685800" y="4343400"/>
+            <a:ext cx="5486400" cy="4114800"/>
+          </a:xfrm>
+          <a:prstGeom prst="rect">
+            <a:avLst/>
+          </a:prstGeom>
+        </p:spPr>
+        <p:txBody>
+          <a:bodyPr anchorCtr="0" anchor="t" bIns="91425" lIns="91425" spcFirstLastPara="1" rIns="91425" wrap="square" tIns="91425">
+            <a:noAutofit/>
+          </a:bodyPr>
+          <a:lstStyle/>
+          <a:p>
+            <a:pPr indent="0" lvl="0" marL="0" rtl="0" algn="l">
+              <a:spcBef>
+                <a:spcPts val="0"/>
+              </a:spcBef>
+              <a:spcAft>
+                <a:spcPts val="0"/>
+              </a:spcAft>
+              <a:buNone/>
+            </a:pPr>
+            <a:r>
+              <a:t/>
+            </a:r>
+            <a:endParaRPr/>
+          </a:p>
+        </p:txBody>
+      </p:sp>
+      <p:sp>
+        <p:nvSpPr>
+          <p:cNvPr id="172" name="Google Shape;172;g20c8cc39a64_0_0:notes"/>
+          <p:cNvSpPr/>
+          <p:nvPr>
+            <p:ph idx="2" type="sldImg"/>
+          </p:nvPr>
+        </p:nvSpPr>
+        <p:spPr>
+          <a:xfrm>
+            <a:off x="1143225" y="685800"/>
+            <a:ext cx="4572300" cy="3429000"/>
+          </a:xfrm>
+          <a:custGeom>
+            <a:rect b="b" l="l" r="r" t="t"/>
+            <a:pathLst>
+              <a:path extrusionOk="0" h="120000" w="120000">
+                <a:moveTo>
+                  <a:pt x="0" y="0"/>
+                </a:moveTo>
+                <a:lnTo>
+                  <a:pt x="120000" y="0"/>
+                </a:lnTo>
+                <a:lnTo>
+                  <a:pt x="120000" y="120000"/>
+                </a:lnTo>
+                <a:lnTo>
+                  <a:pt x="0" y="120000"/>
+                </a:lnTo>
+                <a:close/>
+              </a:path>
+            </a:pathLst>
+          </a:custGeom>
+        </p:spPr>
+      </p:sp>
+    </p:spTree>
+  </p:cSld>
+  <p:clrMapOvr>
+    <a:masterClrMapping/>
+  </p:clrMapOvr>
+</p:notes>
+</file>
+
+<file path=ppt/notesSlides/notesSlide7.xml><?xml version="1.0" encoding="utf-8"?>
+<p:notes xmlns:a="http://schemas.openxmlformats.org/drawingml/2006/main" xmlns:r="http://schemas.openxmlformats.org/officeDocument/2006/relationships" xmlns:mc="http://schemas.openxmlformats.org/markup-compatibility/2006" xmlns:mv="urn:schemas-microsoft-com:mac:vml" xmlns:p="http://schemas.openxmlformats.org/presentationml/2006/main" xmlns:c="http://schemas.openxmlformats.org/drawingml/2006/chart" xmlns:dgm="http://schemas.openxmlformats.org/drawingml/2006/diagram" xmlns:o="urn:schemas-microsoft-com:office:office" xmlns:v="urn:schemas-microsoft-com:vml" xmlns:pvml="urn:schemas-microsoft-com:office:powerpoint" xmlns:com="http://schemas.openxmlformats.org/drawingml/2006/compatibility" xmlns:p14="http://schemas.microsoft.com/office/powerpoint/2010/main" xmlns:p15="http://schemas.microsoft.com/office/powerpoint/2012/main" xmlns:ahyp="http://schemas.microsoft.com/office/drawing/2018/hyperlinkcolor" showMasterPhAnim="0" showMasterSp="0">
+  <p:cSld>
+    <p:spTree>
+      <p:nvGrpSpPr>
+        <p:cNvPr id="181" name="Shape 181"/>
+        <p:cNvGrpSpPr/>
+        <p:nvPr/>
+      </p:nvGrpSpPr>
+      <p:grpSpPr>
+        <a:xfrm>
+          <a:off x="0" y="0"/>
+          <a:ext cx="0" cy="0"/>
+          <a:chOff x="0" y="0"/>
+          <a:chExt cx="0" cy="0"/>
+        </a:xfrm>
+      </p:grpSpPr>
+      <p:sp>
+        <p:nvSpPr>
+          <p:cNvPr id="182" name="Google Shape;182;g20c84e7f2c4_1_5:notes"/>
+          <p:cNvSpPr txBox="1"/>
+          <p:nvPr>
+            <p:ph idx="1" type="body"/>
+          </p:nvPr>
+        </p:nvSpPr>
+        <p:spPr>
+          <a:xfrm>
+            <a:off x="685800" y="4343400"/>
+            <a:ext cx="5486400" cy="4114800"/>
+          </a:xfrm>
+          <a:prstGeom prst="rect">
+            <a:avLst/>
+          </a:prstGeom>
+        </p:spPr>
+        <p:txBody>
+          <a:bodyPr anchorCtr="0" anchor="t" bIns="91425" lIns="91425" spcFirstLastPara="1" rIns="91425" wrap="square" tIns="91425">
+            <a:noAutofit/>
+          </a:bodyPr>
+          <a:lstStyle/>
+          <a:p>
+            <a:pPr indent="0" lvl="0" marL="0" rtl="0" algn="l">
+              <a:spcBef>
+                <a:spcPts val="0"/>
+              </a:spcBef>
+              <a:spcAft>
+                <a:spcPts val="0"/>
+              </a:spcAft>
+              <a:buNone/>
+            </a:pPr>
+            <a:r>
+              <a:t/>
+            </a:r>
+            <a:endParaRPr/>
+          </a:p>
+        </p:txBody>
+      </p:sp>
+      <p:sp>
+        <p:nvSpPr>
+          <p:cNvPr id="183" name="Google Shape;183;g20c84e7f2c4_1_5:notes"/>
+          <p:cNvSpPr/>
+          <p:nvPr>
+            <p:ph idx="2" type="sldImg"/>
+          </p:nvPr>
+        </p:nvSpPr>
+        <p:spPr>
+          <a:xfrm>
+            <a:off x="1143225" y="685800"/>
+            <a:ext cx="4572300" cy="3429000"/>
+          </a:xfrm>
+          <a:custGeom>
+            <a:rect b="b" l="l" r="r" t="t"/>
+            <a:pathLst>
+              <a:path extrusionOk="0" h="120000" w="120000">
+                <a:moveTo>
+                  <a:pt x="0" y="0"/>
+                </a:moveTo>
+                <a:lnTo>
+                  <a:pt x="120000" y="0"/>
+                </a:lnTo>
+                <a:lnTo>
+                  <a:pt x="120000" y="120000"/>
+                </a:lnTo>
+                <a:lnTo>
+                  <a:pt x="0" y="120000"/>
+                </a:lnTo>
+                <a:close/>
+              </a:path>
+            </a:pathLst>
+          </a:custGeom>
+        </p:spPr>
+      </p:sp>
+    </p:spTree>
+  </p:cSld>
+  <p:clrMapOvr>
+    <a:masterClrMapping/>
+  </p:clrMapOvr>
+</p:notes>
+</file>
+
+<file path=ppt/notesSlides/notesSlide8.xml><?xml version="1.0" encoding="utf-8"?>
+<p:notes xmlns:a="http://schemas.openxmlformats.org/drawingml/2006/main" xmlns:r="http://schemas.openxmlformats.org/officeDocument/2006/relationships" xmlns:mc="http://schemas.openxmlformats.org/markup-compatibility/2006" xmlns:mv="urn:schemas-microsoft-com:mac:vml" xmlns:p="http://schemas.openxmlformats.org/presentationml/2006/main" xmlns:c="http://schemas.openxmlformats.org/drawingml/2006/chart" xmlns:dgm="http://schemas.openxmlformats.org/drawingml/2006/diagram" xmlns:o="urn:schemas-microsoft-com:office:office" xmlns:v="urn:schemas-microsoft-com:vml" xmlns:pvml="urn:schemas-microsoft-com:office:powerpoint" xmlns:com="http://schemas.openxmlformats.org/drawingml/2006/compatibility" xmlns:p14="http://schemas.microsoft.com/office/powerpoint/2010/main" xmlns:p15="http://schemas.microsoft.com/office/powerpoint/2012/main" xmlns:ahyp="http://schemas.microsoft.com/office/drawing/2018/hyperlinkcolor" showMasterPhAnim="0" showMasterSp="0">
+  <p:cSld>
+    <p:spTree>
+      <p:nvGrpSpPr>
+        <p:cNvPr id="190" name="Shape 190"/>
+        <p:cNvGrpSpPr/>
+        <p:nvPr/>
+      </p:nvGrpSpPr>
+      <p:grpSpPr>
+        <a:xfrm>
+          <a:off x="0" y="0"/>
+          <a:ext cx="0" cy="0"/>
+          <a:chOff x="0" y="0"/>
+          <a:chExt cx="0" cy="0"/>
+        </a:xfrm>
+      </p:grpSpPr>
+      <p:sp>
+        <p:nvSpPr>
+          <p:cNvPr id="191" name="Google Shape;191;g20c84e7f2c4_1_0:notes"/>
           <p:cNvSpPr/>
           <p:nvPr>
             <p:ph idx="2" type="sldImg"/>
@@ -1142,7 +1442,7 @@
       </p:sp>
       <p:sp>
         <p:nvSpPr>
-          <p:cNvPr id="163" name="Google Shape;163;g20c84e7f2c4_1_0:notes"/>
+          <p:cNvPr id="192" name="Google Shape;192;g20c84e7f2c4_1_0:notes"/>
           <p:cNvSpPr txBox="1"/>
           <p:nvPr>
             <p:ph idx="1" type="body"/>
@@ -1187,12 +1487,12 @@
 </p:notes>
 </file>
 
-<file path=ppt/notesSlides/notesSlide6.xml><?xml version="1.0" encoding="utf-8"?>
+<file path=ppt/notesSlides/notesSlide9.xml><?xml version="1.0" encoding="utf-8"?>
 <p:notes xmlns:a="http://schemas.openxmlformats.org/drawingml/2006/main" xmlns:r="http://schemas.openxmlformats.org/officeDocument/2006/relationships" xmlns:mc="http://schemas.openxmlformats.org/markup-compatibility/2006" xmlns:mv="urn:schemas-microsoft-com:mac:vml" xmlns:p="http://schemas.openxmlformats.org/presentationml/2006/main" xmlns:c="http://schemas.openxmlformats.org/drawingml/2006/chart" xmlns:dgm="http://schemas.openxmlformats.org/drawingml/2006/diagram" xmlns:o="urn:schemas-microsoft-com:office:office" xmlns:v="urn:schemas-microsoft-com:vml" xmlns:pvml="urn:schemas-microsoft-com:office:powerpoint" xmlns:com="http://schemas.openxmlformats.org/drawingml/2006/compatibility" xmlns:p14="http://schemas.microsoft.com/office/powerpoint/2010/main" xmlns:p15="http://schemas.microsoft.com/office/powerpoint/2012/main" xmlns:ahyp="http://schemas.microsoft.com/office/drawing/2018/hyperlinkcolor" showMasterPhAnim="0" showMasterSp="0">
   <p:cSld>
     <p:spTree>
       <p:nvGrpSpPr>
-        <p:cNvPr id="166" name="Shape 166"/>
+        <p:cNvPr id="195" name="Shape 195"/>
         <p:cNvGrpSpPr/>
         <p:nvPr/>
       </p:nvGrpSpPr>
@@ -1206,7 +1506,7 @@
       </p:grpSpPr>
       <p:sp>
         <p:nvSpPr>
-          <p:cNvPr id="167" name="Google Shape;167;g20c285d3583_0_8:notes"/>
+          <p:cNvPr id="196" name="Google Shape;196;g20c285d3583_0_8:notes"/>
           <p:cNvSpPr txBox="1"/>
           <p:nvPr>
             <p:ph idx="1" type="body"/>
@@ -1245,7 +1545,7 @@
       </p:sp>
       <p:sp>
         <p:nvSpPr>
-          <p:cNvPr id="168" name="Google Shape;168;g20c285d3583_0_8:notes"/>
+          <p:cNvPr id="197" name="Google Shape;197;g20c285d3583_0_8:notes"/>
           <p:cNvSpPr/>
           <p:nvPr>
             <p:ph idx="2" type="sldImg"/>
@@ -16533,7 +16833,11 @@
             </a:pPr>
             <a:r>
               <a:rPr lang="en" sz="1400"/>
-              <a:t>Geographical data of the West Region</a:t>
+              <a:t>Geographical Drought data of the </a:t>
+            </a:r>
+            <a:r>
+              <a:rPr lang="en" sz="1400"/>
+              <a:t>Colorado River Basin</a:t>
             </a:r>
             <a:endParaRPr/>
           </a:p>
@@ -16624,7 +16928,15 @@
             </a:pPr>
             <a:r>
               <a:rPr lang="en" sz="1400"/>
-              <a:t>Is there a  significant chance of a severe drought levels for the West Region in the future?</a:t>
+              <a:t>Is there a chance of a severe drought for the </a:t>
+            </a:r>
+            <a:r>
+              <a:rPr lang="en" sz="1400"/>
+              <a:t>Colorado River Basin </a:t>
+            </a:r>
+            <a:r>
+              <a:rPr lang="en" sz="1400"/>
+              <a:t>in the future?</a:t>
             </a:r>
             <a:endParaRPr/>
           </a:p>
@@ -16831,7 +17143,7 @@
                   <a:srgbClr val="C00000"/>
                 </a:solidFill>
               </a:rPr>
-              <a:t>Data Exploration &amp; Analysis</a:t>
+              <a:t>Data Exploration</a:t>
             </a:r>
             <a:endParaRPr/>
           </a:p>
@@ -16860,7 +17172,7 @@
         </p:spPr>
         <p:txBody>
           <a:bodyPr anchorCtr="0" anchor="t" bIns="34275" lIns="68575" spcFirstLastPara="1" rIns="68575" wrap="square" tIns="34275">
-            <a:normAutofit lnSpcReduction="20000"/>
+            <a:normAutofit fontScale="70000" lnSpcReduction="10000"/>
           </a:bodyPr>
           <a:lstStyle/>
           <a:p>
@@ -16877,22 +17189,161 @@
               <a:buClr>
                 <a:schemeClr val="dk1"/>
               </a:buClr>
-              <a:buSzPts val="1400"/>
+              <a:buSzPct val="70000"/>
+              <a:buNone/>
+            </a:pPr>
+            <a:r>
+              <a:rPr b="1" lang="en" sz="2000"/>
+              <a:t>Data Exploration</a:t>
+            </a:r>
+            <a:endParaRPr sz="2000"/>
+          </a:p>
+          <a:p>
+            <a:pPr indent="0" lvl="0" marL="0" rtl="0" algn="l">
+              <a:lnSpc>
+                <a:spcPct val="90000"/>
+              </a:lnSpc>
+              <a:spcBef>
+                <a:spcPts val="200"/>
+              </a:spcBef>
+              <a:spcAft>
+                <a:spcPts val="0"/>
+              </a:spcAft>
+              <a:buClr>
+                <a:schemeClr val="dk1"/>
+              </a:buClr>
+              <a:buSzPct val="77777"/>
+              <a:buNone/>
+            </a:pPr>
+            <a:r>
+              <a:rPr lang="en" sz="1800"/>
+              <a:t>The data researched and gathered for the Colorado River Basin project:</a:t>
+            </a:r>
+            <a:endParaRPr sz="1800"/>
+          </a:p>
+          <a:p>
+            <a:pPr indent="-308610" lvl="0" marL="457200" rtl="0" algn="l">
+              <a:lnSpc>
+                <a:spcPct val="90000"/>
+              </a:lnSpc>
+              <a:spcBef>
+                <a:spcPts val="200"/>
+              </a:spcBef>
+              <a:spcAft>
+                <a:spcPts val="0"/>
+              </a:spcAft>
+              <a:buSzPct val="100000"/>
+              <a:buChar char="•"/>
+            </a:pPr>
+            <a:r>
+              <a:rPr lang="en" sz="1800"/>
+              <a:t>Lake Mead and Lake Powell water storage</a:t>
+            </a:r>
+            <a:endParaRPr sz="1800"/>
+          </a:p>
+          <a:p>
+            <a:pPr indent="-308610" lvl="0" marL="457200" rtl="0" algn="l">
+              <a:lnSpc>
+                <a:spcPct val="90000"/>
+              </a:lnSpc>
+              <a:spcBef>
+                <a:spcPts val="0"/>
+              </a:spcBef>
+              <a:spcAft>
+                <a:spcPts val="0"/>
+              </a:spcAft>
+              <a:buSzPct val="100000"/>
+              <a:buChar char="•"/>
+            </a:pPr>
+            <a:r>
+              <a:rPr lang="en" sz="1800"/>
+              <a:t>Rocky Mountain Snowpack</a:t>
+            </a:r>
+            <a:endParaRPr sz="1800"/>
+          </a:p>
+          <a:p>
+            <a:pPr indent="-308610" lvl="0" marL="457200" rtl="0" algn="l">
+              <a:lnSpc>
+                <a:spcPct val="90000"/>
+              </a:lnSpc>
+              <a:spcBef>
+                <a:spcPts val="0"/>
+              </a:spcBef>
+              <a:spcAft>
+                <a:spcPts val="0"/>
+              </a:spcAft>
+              <a:buSzPct val="100000"/>
+              <a:buChar char="•"/>
+            </a:pPr>
+            <a:r>
+              <a:rPr lang="en" sz="1800"/>
+              <a:t>Colorado Headwaters</a:t>
+            </a:r>
+            <a:endParaRPr sz="1800"/>
+          </a:p>
+          <a:p>
+            <a:pPr indent="-308610" lvl="0" marL="457200" rtl="0" algn="l">
+              <a:lnSpc>
+                <a:spcPct val="90000"/>
+              </a:lnSpc>
+              <a:spcBef>
+                <a:spcPts val="0"/>
+              </a:spcBef>
+              <a:spcAft>
+                <a:spcPts val="0"/>
+              </a:spcAft>
+              <a:buSzPct val="100000"/>
+              <a:buChar char="•"/>
+            </a:pPr>
+            <a:r>
+              <a:rPr lang="en" sz="1800"/>
+              <a:t>Colorado Basin Drought data</a:t>
+            </a:r>
+            <a:endParaRPr sz="1800"/>
+          </a:p>
+          <a:p>
+            <a:pPr indent="-308610" lvl="0" marL="457200" rtl="0" algn="l">
+              <a:lnSpc>
+                <a:spcPct val="90000"/>
+              </a:lnSpc>
+              <a:spcBef>
+                <a:spcPts val="0"/>
+              </a:spcBef>
+              <a:spcAft>
+                <a:spcPts val="0"/>
+              </a:spcAft>
+              <a:buSzPct val="100000"/>
+              <a:buChar char="•"/>
+            </a:pPr>
+            <a:r>
+              <a:rPr lang="en" sz="1800"/>
+              <a:t>Drought data by region</a:t>
+            </a:r>
+            <a:endParaRPr sz="1800"/>
+          </a:p>
+          <a:p>
+            <a:pPr indent="0" lvl="0" marL="0" rtl="0" algn="l">
+              <a:lnSpc>
+                <a:spcPct val="90000"/>
+              </a:lnSpc>
+              <a:spcBef>
+                <a:spcPts val="200"/>
+              </a:spcBef>
+              <a:spcAft>
+                <a:spcPts val="0"/>
+              </a:spcAft>
               <a:buNone/>
             </a:pPr>
             <a:r>
               <a:rPr b="1" lang="en" sz="1400"/>
-              <a:t>Data Exploration</a:t>
+              <a:t> </a:t>
             </a:r>
             <a:endParaRPr/>
           </a:p>
           <a:p>
             <a:pPr indent="0" lvl="0" marL="0" rtl="0" algn="l">
-              <a:lnSpc>
-                <a:spcPct val="90000"/>
-              </a:lnSpc>
-              <a:spcBef>
-                <a:spcPts val="200"/>
+              <a:spcBef>
+                <a:spcPts val="0"/>
               </a:spcBef>
               <a:spcAft>
                 <a:spcPts val="0"/>
@@ -16900,213 +17351,27 @@
               <a:buClr>
                 <a:schemeClr val="dk1"/>
               </a:buClr>
-              <a:buSzPts val="1400"/>
+              <a:buSzPct val="70000"/>
               <a:buNone/>
             </a:pPr>
             <a:r>
-              <a:rPr lang="en" sz="1400"/>
-              <a:t>The data researched and gathered for the Colorado River Basin project:</a:t>
+              <a:rPr b="1" lang="en" sz="2000"/>
+              <a:t>Extract Process</a:t>
             </a:r>
-            <a:endParaRPr sz="1400"/>
-          </a:p>
-          <a:p>
-            <a:pPr indent="-317500" lvl="0" marL="457200" rtl="0" algn="l">
-              <a:lnSpc>
-                <a:spcPct val="90000"/>
-              </a:lnSpc>
-              <a:spcBef>
-                <a:spcPts val="200"/>
-              </a:spcBef>
-              <a:spcAft>
-                <a:spcPts val="0"/>
-              </a:spcAft>
-              <a:buSzPts val="1400"/>
-              <a:buChar char="•"/>
-            </a:pPr>
-            <a:r>
-              <a:rPr lang="en" sz="1400"/>
-              <a:t>Lake Mead and Lake Powell water storage</a:t>
-            </a:r>
-            <a:endParaRPr sz="1400"/>
-          </a:p>
-          <a:p>
-            <a:pPr indent="-317500" lvl="0" marL="457200" rtl="0" algn="l">
-              <a:lnSpc>
-                <a:spcPct val="90000"/>
-              </a:lnSpc>
-              <a:spcBef>
-                <a:spcPts val="0"/>
-              </a:spcBef>
-              <a:spcAft>
-                <a:spcPts val="0"/>
-              </a:spcAft>
-              <a:buSzPts val="1400"/>
-              <a:buChar char="•"/>
-            </a:pPr>
-            <a:r>
-              <a:rPr lang="en" sz="1400"/>
-              <a:t>Rocky Mountain Snowpack</a:t>
-            </a:r>
-            <a:endParaRPr sz="1400"/>
-          </a:p>
-          <a:p>
-            <a:pPr indent="-317500" lvl="0" marL="457200" rtl="0" algn="l">
-              <a:lnSpc>
-                <a:spcPct val="90000"/>
-              </a:lnSpc>
-              <a:spcBef>
-                <a:spcPts val="0"/>
-              </a:spcBef>
-              <a:spcAft>
-                <a:spcPts val="0"/>
-              </a:spcAft>
-              <a:buSzPts val="1400"/>
-              <a:buChar char="•"/>
-            </a:pPr>
-            <a:r>
-              <a:rPr lang="en" sz="1400"/>
-              <a:t>Colorado Headwaters</a:t>
-            </a:r>
-            <a:endParaRPr sz="1400"/>
-          </a:p>
-          <a:p>
-            <a:pPr indent="-317500" lvl="0" marL="457200" rtl="0" algn="l">
-              <a:lnSpc>
-                <a:spcPct val="90000"/>
-              </a:lnSpc>
-              <a:spcBef>
-                <a:spcPts val="0"/>
-              </a:spcBef>
-              <a:spcAft>
-                <a:spcPts val="0"/>
-              </a:spcAft>
-              <a:buSzPts val="1400"/>
-              <a:buChar char="•"/>
-            </a:pPr>
-            <a:r>
-              <a:rPr lang="en" sz="1400"/>
-              <a:t>Colorado Basin Drought data</a:t>
-            </a:r>
-            <a:endParaRPr sz="1400"/>
-          </a:p>
-          <a:p>
-            <a:pPr indent="-317500" lvl="0" marL="457200" rtl="0" algn="l">
-              <a:lnSpc>
-                <a:spcPct val="90000"/>
-              </a:lnSpc>
-              <a:spcBef>
-                <a:spcPts val="0"/>
-              </a:spcBef>
-              <a:spcAft>
-                <a:spcPts val="0"/>
-              </a:spcAft>
-              <a:buSzPts val="1400"/>
-              <a:buChar char="•"/>
-            </a:pPr>
-            <a:r>
-              <a:rPr lang="en" sz="1400"/>
-              <a:t>Drought data by region</a:t>
-            </a:r>
-            <a:endParaRPr sz="1400"/>
-          </a:p>
-          <a:p>
-            <a:pPr indent="0" lvl="0" marL="0" rtl="0" algn="l">
-              <a:lnSpc>
-                <a:spcPct val="90000"/>
-              </a:lnSpc>
-              <a:spcBef>
-                <a:spcPts val="200"/>
-              </a:spcBef>
-              <a:spcAft>
-                <a:spcPts val="0"/>
-              </a:spcAft>
-              <a:buNone/>
-            </a:pPr>
-            <a:r>
-              <a:rPr b="1" lang="en" sz="1400"/>
-              <a:t> </a:t>
-            </a:r>
-            <a:endParaRPr b="1" sz="1400"/>
-          </a:p>
-          <a:p>
-            <a:pPr indent="0" lvl="0" marL="0" rtl="0" algn="l">
-              <a:lnSpc>
-                <a:spcPct val="90000"/>
-              </a:lnSpc>
-              <a:spcBef>
-                <a:spcPts val="0"/>
-              </a:spcBef>
-              <a:spcAft>
-                <a:spcPts val="0"/>
-              </a:spcAft>
-              <a:buClr>
-                <a:schemeClr val="dk1"/>
-              </a:buClr>
-              <a:buSzPts val="1400"/>
-              <a:buNone/>
-            </a:pPr>
-            <a:r>
-              <a:rPr b="1" lang="en" sz="1400"/>
-              <a:t>Data Analysis:</a:t>
-            </a:r>
-            <a:endParaRPr/>
-          </a:p>
-          <a:p>
-            <a:pPr indent="0" lvl="0" marL="0" rtl="0" algn="l">
-              <a:lnSpc>
-                <a:spcPct val="90000"/>
-              </a:lnSpc>
-              <a:spcBef>
-                <a:spcPts val="200"/>
-              </a:spcBef>
-              <a:spcAft>
-                <a:spcPts val="0"/>
-              </a:spcAft>
-              <a:buClr>
-                <a:schemeClr val="dk1"/>
-              </a:buClr>
-              <a:buSzPts val="1400"/>
-              <a:buNone/>
-            </a:pPr>
-            <a:r>
-              <a:rPr lang="en" sz="1400">
-                <a:solidFill>
-                  <a:srgbClr val="24292F"/>
-                </a:solidFill>
-                <a:highlight>
-                  <a:srgbClr val="FFFFFF"/>
-                </a:highlight>
-              </a:rPr>
-              <a:t>The </a:t>
-            </a:r>
-            <a:r>
-              <a:rPr lang="en" sz="1400"/>
-              <a:t>Colorado River Basin </a:t>
-            </a:r>
-            <a:r>
-              <a:rPr lang="en" sz="1400">
-                <a:solidFill>
-                  <a:srgbClr val="24292F"/>
-                </a:solidFill>
-                <a:highlight>
-                  <a:srgbClr val="FFFFFF"/>
-                </a:highlight>
-              </a:rPr>
-              <a:t>dataset contained over 200 records, as such we utilized a few techniques to train and evaluate models based on the drought data.  In applying the train and test methodology to the dataset, the data Training score is 68% and Testing score is 70%.</a:t>
-            </a:r>
-            <a:endParaRPr sz="1400">
+            <a:endParaRPr b="1" sz="2000">
               <a:solidFill>
                 <a:srgbClr val="24292F"/>
               </a:solidFill>
-              <a:highlight>
-                <a:srgbClr val="FFFFFF"/>
-              </a:highlight>
+              <a:latin typeface="Arial"/>
+              <a:ea typeface="Arial"/>
+              <a:cs typeface="Arial"/>
+              <a:sym typeface="Arial"/>
             </a:endParaRPr>
           </a:p>
           <a:p>
             <a:pPr indent="0" lvl="0" marL="0" rtl="0" algn="l">
               <a:lnSpc>
-                <a:spcPct val="90000"/>
+                <a:spcPct val="115000"/>
               </a:lnSpc>
               <a:spcBef>
                 <a:spcPts val="0"/>
@@ -17117,21 +17382,31 @@
               <a:buClr>
                 <a:schemeClr val="dk1"/>
               </a:buClr>
-              <a:buSzPts val="1400"/>
+              <a:buSzPct val="55000"/>
+              <a:buFont typeface="Arial"/>
               <a:buNone/>
             </a:pPr>
             <a:r>
-              <a:t/>
+              <a:rPr lang="en" sz="2000">
+                <a:solidFill>
+                  <a:srgbClr val="24292F"/>
+                </a:solidFill>
+              </a:rPr>
+              <a:t>The team searched the internet for the Colorado River Basin drought data, Colorado Rocky Mountain snowpack data and Lake Mead and Powell water storage data. For each dataset the data was queried in the respective site</a:t>
             </a:r>
-            <a:endParaRPr sz="1400"/>
+            <a:endParaRPr sz="2000">
+              <a:solidFill>
+                <a:srgbClr val="24292F"/>
+              </a:solidFill>
+            </a:endParaRPr>
           </a:p>
           <a:p>
             <a:pPr indent="0" lvl="0" marL="0" rtl="0" algn="l">
               <a:lnSpc>
-                <a:spcPct val="90000"/>
-              </a:lnSpc>
-              <a:spcBef>
-                <a:spcPts val="200"/>
+                <a:spcPct val="115000"/>
+              </a:lnSpc>
+              <a:spcBef>
+                <a:spcPts val="0"/>
               </a:spcBef>
               <a:spcAft>
                 <a:spcPts val="0"/>
@@ -17139,102 +17414,183 @@
               <a:buClr>
                 <a:schemeClr val="dk1"/>
               </a:buClr>
-              <a:buSzPts val="1400"/>
+              <a:buSzPct val="55000"/>
+              <a:buFont typeface="Arial"/>
               <a:buNone/>
             </a:pPr>
             <a:r>
-              <a:rPr lang="en" sz="1400"/>
-              <a:t>In analyzing the data via Supervised ML</a:t>
+              <a:rPr lang="en" sz="2000">
+                <a:solidFill>
+                  <a:srgbClr val="24292F"/>
+                </a:solidFill>
+              </a:rPr>
+              <a:t>and csv formatted files were extracted. The csv datasets are as follows:</a:t>
             </a:r>
-            <a:endParaRPr sz="1400"/>
+            <a:endParaRPr sz="2000">
+              <a:solidFill>
+                <a:srgbClr val="24292F"/>
+              </a:solidFill>
+            </a:endParaRPr>
           </a:p>
           <a:p>
             <a:pPr indent="-317500" lvl="0" marL="457200" rtl="0" algn="l">
               <a:lnSpc>
-                <a:spcPct val="90000"/>
-              </a:lnSpc>
-              <a:spcBef>
-                <a:spcPts val="200"/>
-              </a:spcBef>
-              <a:spcAft>
-                <a:spcPts val="0"/>
-              </a:spcAft>
-              <a:buSzPts val="1400"/>
+                <a:spcPct val="115000"/>
+              </a:lnSpc>
+              <a:spcBef>
+                <a:spcPts val="0"/>
+              </a:spcBef>
+              <a:spcAft>
+                <a:spcPts val="0"/>
+              </a:spcAft>
+              <a:buClr>
+                <a:srgbClr val="24292F"/>
+              </a:buClr>
+              <a:buSzPct val="100000"/>
               <a:buChar char="•"/>
             </a:pPr>
             <a:r>
-              <a:rPr lang="en" sz="1400"/>
-              <a:t>Accuracy score: 70%</a:t>
+              <a:rPr lang="en" sz="2000">
+                <a:solidFill>
+                  <a:srgbClr val="24292F"/>
+                </a:solidFill>
+              </a:rPr>
+              <a:t>Drought for the Colorado River Basin as percent area</a:t>
             </a:r>
-            <a:endParaRPr sz="1400"/>
+            <a:endParaRPr sz="2000">
+              <a:solidFill>
+                <a:srgbClr val="24292F"/>
+              </a:solidFill>
+            </a:endParaRPr>
           </a:p>
           <a:p>
             <a:pPr indent="-317500" lvl="0" marL="457200" rtl="0" algn="l">
               <a:lnSpc>
-                <a:spcPct val="90000"/>
-              </a:lnSpc>
-              <a:spcBef>
-                <a:spcPts val="0"/>
-              </a:spcBef>
-              <a:spcAft>
-                <a:spcPts val="0"/>
-              </a:spcAft>
-              <a:buSzPts val="1400"/>
+                <a:spcPct val="115000"/>
+              </a:lnSpc>
+              <a:spcBef>
+                <a:spcPts val="0"/>
+              </a:spcBef>
+              <a:spcAft>
+                <a:spcPts val="0"/>
+              </a:spcAft>
+              <a:buClr>
+                <a:srgbClr val="24292F"/>
+              </a:buClr>
+              <a:buSzPct val="100000"/>
               <a:buChar char="•"/>
             </a:pPr>
             <a:r>
-              <a:rPr lang="en" sz="1400"/>
-              <a:t>Drought Severity High (0):  precision: 72%, recall 85%</a:t>
+              <a:rPr lang="en" sz="2000">
+                <a:solidFill>
+                  <a:srgbClr val="24292F"/>
+                </a:solidFill>
+              </a:rPr>
+              <a:t>Colorado River headwaters: Rocky Mountain snowpack as snow water equivalent (SWE) in inches</a:t>
             </a:r>
-            <a:endParaRPr sz="1400"/>
+            <a:endParaRPr sz="2000">
+              <a:solidFill>
+                <a:srgbClr val="24292F"/>
+              </a:solidFill>
+            </a:endParaRPr>
           </a:p>
           <a:p>
             <a:pPr indent="-317500" lvl="0" marL="457200" rtl="0" algn="l">
               <a:lnSpc>
-                <a:spcPct val="90000"/>
-              </a:lnSpc>
-              <a:spcBef>
-                <a:spcPts val="0"/>
-              </a:spcBef>
-              <a:spcAft>
-                <a:spcPts val="0"/>
-              </a:spcAft>
-              <a:buSzPts val="1400"/>
+                <a:spcPct val="115000"/>
+              </a:lnSpc>
+              <a:spcBef>
+                <a:spcPts val="0"/>
+              </a:spcBef>
+              <a:spcAft>
+                <a:spcPts val="0"/>
+              </a:spcAft>
+              <a:buClr>
+                <a:srgbClr val="24292F"/>
+              </a:buClr>
+              <a:buSzPct val="100000"/>
               <a:buChar char="•"/>
             </a:pPr>
             <a:r>
-              <a:rPr lang="en" sz="1400"/>
-              <a:t>Drought Severity Low (1): precision: 65%, recall 46%</a:t>
+              <a:rPr lang="en" sz="2000">
+                <a:solidFill>
+                  <a:srgbClr val="24292F"/>
+                </a:solidFill>
+              </a:rPr>
+              <a:t>Lake Mead water storage in square feet</a:t>
             </a:r>
-            <a:endParaRPr sz="1400"/>
+            <a:endParaRPr sz="2000">
+              <a:solidFill>
+                <a:srgbClr val="24292F"/>
+              </a:solidFill>
+            </a:endParaRPr>
           </a:p>
           <a:p>
             <a:pPr indent="-317500" lvl="0" marL="457200" rtl="0" algn="l">
               <a:lnSpc>
-                <a:spcPct val="90000"/>
-              </a:lnSpc>
-              <a:spcBef>
-                <a:spcPts val="0"/>
-              </a:spcBef>
-              <a:spcAft>
-                <a:spcPts val="0"/>
-              </a:spcAft>
-              <a:buSzPts val="1400"/>
+                <a:spcPct val="115000"/>
+              </a:lnSpc>
+              <a:spcBef>
+                <a:spcPts val="0"/>
+              </a:spcBef>
+              <a:spcAft>
+                <a:spcPts val="0"/>
+              </a:spcAft>
+              <a:buClr>
+                <a:srgbClr val="24292F"/>
+              </a:buClr>
+              <a:buSzPct val="100000"/>
               <a:buChar char="•"/>
             </a:pPr>
             <a:r>
-              <a:rPr lang="en" sz="1400"/>
-              <a:t>F1 score: 78%</a:t>
+              <a:rPr lang="en" sz="2000">
+                <a:solidFill>
+                  <a:srgbClr val="24292F"/>
+                </a:solidFill>
+              </a:rPr>
+              <a:t>Lake Powell water storage in square feet</a:t>
             </a:r>
-            <a:endParaRPr sz="1400"/>
+            <a:endParaRPr sz="2000">
+              <a:solidFill>
+                <a:srgbClr val="24292F"/>
+              </a:solidFill>
+            </a:endParaRPr>
+          </a:p>
+          <a:p>
+            <a:pPr indent="-317500" lvl="0" marL="457200" rtl="0" algn="l">
+              <a:lnSpc>
+                <a:spcPct val="115000"/>
+              </a:lnSpc>
+              <a:spcBef>
+                <a:spcPts val="0"/>
+              </a:spcBef>
+              <a:spcAft>
+                <a:spcPts val="0"/>
+              </a:spcAft>
+              <a:buClr>
+                <a:srgbClr val="24292F"/>
+              </a:buClr>
+              <a:buSzPct val="100000"/>
+              <a:buChar char="•"/>
+            </a:pPr>
+            <a:r>
+              <a:rPr lang="en" sz="2000">
+                <a:solidFill>
+                  <a:srgbClr val="24292F"/>
+                </a:solidFill>
+              </a:rPr>
+              <a:t>Other datasets/features we thought of but decided not to include due to assumed overload; “don’t bite off more than we can chew” (population, farming, energy sector, tourism, El Nino/La Nina)</a:t>
+            </a:r>
+            <a:endParaRPr sz="2000">
+              <a:solidFill>
+                <a:srgbClr val="24292F"/>
+              </a:solidFill>
+            </a:endParaRPr>
           </a:p>
           <a:p>
             <a:pPr indent="0" lvl="0" marL="0" rtl="0" algn="l">
-              <a:lnSpc>
-                <a:spcPct val="90000"/>
-              </a:lnSpc>
-              <a:spcBef>
-                <a:spcPts val="200"/>
+              <a:spcBef>
+                <a:spcPts val="0"/>
               </a:spcBef>
               <a:spcAft>
                 <a:spcPts val="0"/>
@@ -17242,51 +17598,8 @@
               <a:buClr>
                 <a:schemeClr val="dk1"/>
               </a:buClr>
-              <a:buSzPts val="1400"/>
-              <a:buNone/>
-            </a:pPr>
-            <a:r>
-              <a:t/>
-            </a:r>
-            <a:endParaRPr sz="1400"/>
-          </a:p>
-          <a:p>
-            <a:pPr indent="0" lvl="0" marL="0" rtl="0" algn="l">
-              <a:lnSpc>
-                <a:spcPct val="90000"/>
-              </a:lnSpc>
-              <a:spcBef>
-                <a:spcPts val="0"/>
-              </a:spcBef>
-              <a:spcAft>
-                <a:spcPts val="0"/>
-              </a:spcAft>
-              <a:buClr>
-                <a:schemeClr val="dk1"/>
-              </a:buClr>
-              <a:buSzPts val="1400"/>
-              <a:buNone/>
-            </a:pPr>
-            <a:r>
-              <a:t/>
-            </a:r>
-            <a:endParaRPr/>
-          </a:p>
-          <a:p>
-            <a:pPr indent="0" lvl="0" marL="0" rtl="0" algn="l">
-              <a:lnSpc>
-                <a:spcPct val="90000"/>
-              </a:lnSpc>
-              <a:spcBef>
-                <a:spcPts val="0"/>
-              </a:spcBef>
-              <a:spcAft>
-                <a:spcPts val="0"/>
-              </a:spcAft>
-              <a:buClr>
-                <a:schemeClr val="dk1"/>
-              </a:buClr>
-              <a:buSzPts val="1400"/>
+              <a:buSzPct val="100000"/>
+              <a:buFont typeface="Arial"/>
               <a:buNone/>
             </a:pPr>
             <a:r>
@@ -17475,7 +17788,7 @@
                   <a:srgbClr val="C00000"/>
                 </a:solidFill>
               </a:rPr>
-              <a:t>Summary</a:t>
+              <a:t>Data Exploration cont.</a:t>
             </a:r>
             <a:endParaRPr/>
           </a:p>
@@ -17509,11 +17822,8 @@
           <a:lstStyle/>
           <a:p>
             <a:pPr indent="0" lvl="0" marL="0" rtl="0" algn="l">
-              <a:lnSpc>
-                <a:spcPct val="90000"/>
-              </a:lnSpc>
-              <a:spcBef>
-                <a:spcPts val="200"/>
+              <a:spcBef>
+                <a:spcPts val="0"/>
               </a:spcBef>
               <a:spcAft>
                 <a:spcPts val="0"/>
@@ -17522,11 +17832,16 @@
                 <a:schemeClr val="dk1"/>
               </a:buClr>
               <a:buSzPts val="1400"/>
+              <a:buFont typeface="Arial"/>
               <a:buNone/>
             </a:pPr>
             <a:r>
-              <a:rPr lang="en" sz="1400"/>
-              <a:t>The Colorado River Basin is a complex region with high population growth in many of the metro areas as well as expansive agriculture areas that both depend on and use the river water. There are most likely other features that when added to the dataset could enhance and improve the machine learning component to better predict severe-to-worse-drought for this region. In particular, it would be ideal to find features that could improve the recall (sensitivity) value for predicting severe-to-worse-drought because even when predicted true with an actual false outcome it would trigger the region to conserve water usage as a reaction to the prediction. Having a solid drought prediction model would better prepare the region for water conservation action during periods of drought or non-drought.</a:t>
+              <a:rPr b="1" lang="en" sz="1400"/>
+              <a:t>Transformation </a:t>
+            </a:r>
+            <a:r>
+              <a:rPr b="1" lang="en" sz="1400"/>
+              <a:t>Process</a:t>
             </a:r>
             <a:endParaRPr sz="1400"/>
           </a:p>
@@ -17548,7 +17863,12 @@
               <a:buNone/>
             </a:pPr>
             <a:r>
-              <a:t/>
+              <a:rPr lang="en" sz="1400"/>
+              <a:t>We </a:t>
+            </a:r>
+            <a:r>
+              <a:rPr lang="en" sz="1400"/>
+              <a:t>reformatted the four CSV files in order to merge into a single dataset for our Machine Learning model.</a:t>
             </a:r>
             <a:endParaRPr sz="1400"/>
           </a:p>
@@ -17558,27 +17878,103 @@
                 <a:spcPct val="90000"/>
               </a:lnSpc>
               <a:spcBef>
-                <a:spcPts val="0"/>
-              </a:spcBef>
-              <a:spcAft>
-                <a:spcPts val="0"/>
-              </a:spcAft>
-              <a:buClr>
-                <a:schemeClr val="dk1"/>
-              </a:buClr>
-              <a:buSzPts val="1400"/>
+                <a:spcPts val="200"/>
+              </a:spcBef>
+              <a:spcAft>
+                <a:spcPts val="0"/>
+              </a:spcAft>
               <a:buNone/>
             </a:pPr>
             <a:r>
-              <a:t/>
+              <a:rPr b="1" lang="en" sz="1400"/>
+              <a:t> </a:t>
             </a:r>
-            <a:endParaRPr/>
+            <a:endParaRPr sz="1400"/>
           </a:p>
           <a:p>
             <a:pPr indent="0" lvl="0" marL="0" rtl="0" algn="l">
+              <a:spcBef>
+                <a:spcPts val="0"/>
+              </a:spcBef>
+              <a:spcAft>
+                <a:spcPts val="0"/>
+              </a:spcAft>
+              <a:buClr>
+                <a:schemeClr val="dk1"/>
+              </a:buClr>
+              <a:buSzPts val="1400"/>
+              <a:buNone/>
+            </a:pPr>
+            <a:r>
+              <a:rPr b="1" lang="en" sz="1400"/>
+              <a:t>Load </a:t>
+            </a:r>
+            <a:r>
+              <a:rPr b="1" lang="en" sz="1400"/>
+              <a:t>Process</a:t>
+            </a:r>
+            <a:endParaRPr b="1" sz="1400">
+              <a:solidFill>
+                <a:srgbClr val="24292F"/>
+              </a:solidFill>
+            </a:endParaRPr>
+          </a:p>
+          <a:p>
+            <a:pPr indent="-317500" lvl="0" marL="457200" rtl="0" algn="l">
+              <a:lnSpc>
+                <a:spcPct val="115000"/>
+              </a:lnSpc>
+              <a:spcBef>
+                <a:spcPts val="0"/>
+              </a:spcBef>
+              <a:spcAft>
+                <a:spcPts val="0"/>
+              </a:spcAft>
+              <a:buSzPts val="1400"/>
+              <a:buFont typeface="Calibri"/>
+              <a:buChar char="•"/>
+            </a:pPr>
+            <a:r>
+              <a:rPr lang="en" sz="1400">
+                <a:solidFill>
+                  <a:srgbClr val="24292F"/>
+                </a:solidFill>
+              </a:rPr>
+              <a:t>Created single csv (the merge csv files from above) to be loaded in to ML script</a:t>
+            </a:r>
+            <a:endParaRPr sz="1400">
+              <a:solidFill>
+                <a:srgbClr val="24292F"/>
+              </a:solidFill>
+            </a:endParaRPr>
+          </a:p>
+          <a:p>
+            <a:pPr indent="-317500" lvl="0" marL="457200" rtl="0" algn="l">
               <a:lnSpc>
                 <a:spcPct val="90000"/>
               </a:lnSpc>
+              <a:spcBef>
+                <a:spcPts val="0"/>
+              </a:spcBef>
+              <a:spcAft>
+                <a:spcPts val="0"/>
+              </a:spcAft>
+              <a:buSzPts val="1400"/>
+              <a:buFont typeface="Calibri"/>
+              <a:buChar char="•"/>
+            </a:pPr>
+            <a:r>
+              <a:rPr lang="en" sz="1400"/>
+              <a:t>Our method of reading in csv files makes the most sense; in theory moving forward analysts can update the csv files and re-read back in.  Building a database would be unnecessary overhead for the size of the dataset</a:t>
+            </a:r>
+            <a:r>
+              <a:rPr lang="en" sz="1800"/>
+              <a:t>.</a:t>
+            </a:r>
+            <a:endParaRPr sz="1800"/>
+          </a:p>
+          <a:p>
+            <a:pPr indent="0" lvl="0" marL="0" rtl="0" algn="l">
               <a:spcBef>
                 <a:spcPts val="0"/>
               </a:spcBef>
@@ -17713,13 +18109,6 @@
 <file path=ppt/slides/slide5.xml><?xml version="1.0" encoding="utf-8"?>
 <p:sld xmlns:a="http://schemas.openxmlformats.org/drawingml/2006/main" xmlns:r="http://schemas.openxmlformats.org/officeDocument/2006/relationships" xmlns:mc="http://schemas.openxmlformats.org/markup-compatibility/2006" xmlns:mv="urn:schemas-microsoft-com:mac:vml" xmlns:p="http://schemas.openxmlformats.org/presentationml/2006/main" xmlns:c="http://schemas.openxmlformats.org/drawingml/2006/chart" xmlns:dgm="http://schemas.openxmlformats.org/drawingml/2006/diagram" xmlns:o="urn:schemas-microsoft-com:office:office" xmlns:v="urn:schemas-microsoft-com:vml" xmlns:pvml="urn:schemas-microsoft-com:office:powerpoint" xmlns:com="http://schemas.openxmlformats.org/drawingml/2006/compatibility" xmlns:p14="http://schemas.microsoft.com/office/powerpoint/2010/main" xmlns:p15="http://schemas.microsoft.com/office/powerpoint/2012/main" xmlns:ahyp="http://schemas.microsoft.com/office/drawing/2018/hyperlinkcolor">
   <p:cSld>
-    <p:bg>
-      <p:bgPr>
-        <a:solidFill>
-          <a:srgbClr val="FCE5CD"/>
-        </a:solidFill>
-      </p:bgPr>
-    </p:bg>
     <p:spTree>
       <p:nvGrpSpPr>
         <p:cNvPr id="164" name="Shape 164"/>
@@ -17737,71 +18126,6 @@
       <p:sp>
         <p:nvSpPr>
           <p:cNvPr id="165" name="Google Shape;165;p29"/>
-          <p:cNvSpPr txBox="1"/>
-          <p:nvPr>
-            <p:ph type="title"/>
-          </p:nvPr>
-        </p:nvSpPr>
-        <p:spPr>
-          <a:xfrm>
-            <a:off x="628650" y="273844"/>
-            <a:ext cx="7886700" cy="994200"/>
-          </a:xfrm>
-          <a:prstGeom prst="rect">
-            <a:avLst/>
-          </a:prstGeom>
-        </p:spPr>
-        <p:txBody>
-          <a:bodyPr anchorCtr="0" anchor="ctr" bIns="34275" lIns="68575" spcFirstLastPara="1" rIns="68575" wrap="square" tIns="34275">
-            <a:normAutofit/>
-          </a:bodyPr>
-          <a:lstStyle/>
-          <a:p>
-            <a:pPr indent="0" lvl="0" marL="0" rtl="0" algn="l">
-              <a:spcBef>
-                <a:spcPts val="0"/>
-              </a:spcBef>
-              <a:spcAft>
-                <a:spcPts val="0"/>
-              </a:spcAft>
-              <a:buNone/>
-            </a:pPr>
-            <a:r>
-              <a:rPr lang="en"/>
-              <a:t>Appendix</a:t>
-            </a:r>
-            <a:endParaRPr/>
-          </a:p>
-        </p:txBody>
-      </p:sp>
-    </p:spTree>
-  </p:cSld>
-  <p:clrMapOvr>
-    <a:masterClrMapping/>
-  </p:clrMapOvr>
-</p:sld>
-</file>
-
-<file path=ppt/slides/slide6.xml><?xml version="1.0" encoding="utf-8"?>
-<p:sld xmlns:a="http://schemas.openxmlformats.org/drawingml/2006/main" xmlns:r="http://schemas.openxmlformats.org/officeDocument/2006/relationships" xmlns:mc="http://schemas.openxmlformats.org/markup-compatibility/2006" xmlns:mv="urn:schemas-microsoft-com:mac:vml" xmlns:p="http://schemas.openxmlformats.org/presentationml/2006/main" xmlns:c="http://schemas.openxmlformats.org/drawingml/2006/chart" xmlns:dgm="http://schemas.openxmlformats.org/drawingml/2006/diagram" xmlns:o="urn:schemas-microsoft-com:office:office" xmlns:v="urn:schemas-microsoft-com:vml" xmlns:pvml="urn:schemas-microsoft-com:office:powerpoint" xmlns:com="http://schemas.openxmlformats.org/drawingml/2006/compatibility" xmlns:p14="http://schemas.microsoft.com/office/powerpoint/2010/main" xmlns:p15="http://schemas.microsoft.com/office/powerpoint/2012/main" xmlns:ahyp="http://schemas.microsoft.com/office/drawing/2018/hyperlinkcolor">
-  <p:cSld>
-    <p:spTree>
-      <p:nvGrpSpPr>
-        <p:cNvPr id="169" name="Shape 169"/>
-        <p:cNvGrpSpPr/>
-        <p:nvPr/>
-      </p:nvGrpSpPr>
-      <p:grpSpPr>
-        <a:xfrm>
-          <a:off x="0" y="0"/>
-          <a:ext cx="0" cy="0"/>
-          <a:chOff x="0" y="0"/>
-          <a:chExt cx="0" cy="0"/>
-        </a:xfrm>
-      </p:grpSpPr>
-      <p:sp>
-        <p:nvSpPr>
-          <p:cNvPr id="170" name="Google Shape;170;p30"/>
           <p:cNvSpPr txBox="1"/>
           <p:nvPr>
             <p:ph type="title"/>
@@ -17849,7 +18173,7 @@
                   <a:srgbClr val="C00000"/>
                 </a:solidFill>
               </a:rPr>
-              <a:t>Technology and Algorithms</a:t>
+              <a:t>Data Analysis</a:t>
             </a:r>
             <a:endParaRPr/>
           </a:p>
@@ -17857,7 +18181,7 @@
       </p:sp>
       <p:sp>
         <p:nvSpPr>
-          <p:cNvPr id="171" name="Google Shape;171;p30"/>
+          <p:cNvPr id="166" name="Google Shape;166;p29"/>
           <p:cNvSpPr txBox="1"/>
           <p:nvPr>
             <p:ph idx="1" type="body"/>
@@ -17887,6 +18211,103 @@
                 <a:spcPct val="90000"/>
               </a:lnSpc>
               <a:spcBef>
+                <a:spcPts val="0"/>
+              </a:spcBef>
+              <a:spcAft>
+                <a:spcPts val="0"/>
+              </a:spcAft>
+              <a:buClr>
+                <a:schemeClr val="dk1"/>
+              </a:buClr>
+              <a:buSzPts val="1400"/>
+              <a:buNone/>
+            </a:pPr>
+            <a:r>
+              <a:rPr b="1" lang="en" sz="1400"/>
+              <a:t>Data Analysis:</a:t>
+            </a:r>
+            <a:endParaRPr/>
+          </a:p>
+          <a:p>
+            <a:pPr indent="0" lvl="0" marL="0" rtl="0" algn="l">
+              <a:lnSpc>
+                <a:spcPct val="90000"/>
+              </a:lnSpc>
+              <a:spcBef>
+                <a:spcPts val="200"/>
+              </a:spcBef>
+              <a:spcAft>
+                <a:spcPts val="0"/>
+              </a:spcAft>
+              <a:buClr>
+                <a:schemeClr val="dk1"/>
+              </a:buClr>
+              <a:buSzPts val="1400"/>
+              <a:buNone/>
+            </a:pPr>
+            <a:r>
+              <a:rPr lang="en" sz="1400">
+                <a:solidFill>
+                  <a:srgbClr val="24292F"/>
+                </a:solidFill>
+                <a:highlight>
+                  <a:srgbClr val="FFFFFF"/>
+                </a:highlight>
+              </a:rPr>
+              <a:t>The </a:t>
+            </a:r>
+            <a:r>
+              <a:rPr lang="en" sz="1400"/>
+              <a:t>Colorado River Basin </a:t>
+            </a:r>
+            <a:r>
+              <a:rPr lang="en" sz="1400">
+                <a:solidFill>
+                  <a:srgbClr val="24292F"/>
+                </a:solidFill>
+                <a:highlight>
+                  <a:srgbClr val="FFFFFF"/>
+                </a:highlight>
+              </a:rPr>
+              <a:t>dataset contained over 250 records, as such we utilized a few techniques to train and evaluate models based on the drought data.  In applying the train and test methodology to the dataset, the data Training score is 68% and Testing score is 70%.</a:t>
+            </a:r>
+            <a:endParaRPr sz="1400">
+              <a:solidFill>
+                <a:srgbClr val="24292F"/>
+              </a:solidFill>
+              <a:highlight>
+                <a:srgbClr val="FFFFFF"/>
+              </a:highlight>
+            </a:endParaRPr>
+          </a:p>
+          <a:p>
+            <a:pPr indent="0" lvl="0" marL="0" rtl="0" algn="l">
+              <a:lnSpc>
+                <a:spcPct val="90000"/>
+              </a:lnSpc>
+              <a:spcBef>
+                <a:spcPts val="0"/>
+              </a:spcBef>
+              <a:spcAft>
+                <a:spcPts val="0"/>
+              </a:spcAft>
+              <a:buClr>
+                <a:schemeClr val="dk1"/>
+              </a:buClr>
+              <a:buSzPts val="1400"/>
+              <a:buNone/>
+            </a:pPr>
+            <a:r>
+              <a:t/>
+            </a:r>
+            <a:endParaRPr sz="1400"/>
+          </a:p>
+          <a:p>
+            <a:pPr indent="0" lvl="0" marL="0" rtl="0" algn="l">
+              <a:lnSpc>
+                <a:spcPct val="90000"/>
+              </a:lnSpc>
+              <a:spcBef>
                 <a:spcPts val="200"/>
               </a:spcBef>
               <a:spcAft>
@@ -17900,7 +18321,7 @@
             </a:pPr>
             <a:r>
               <a:rPr lang="en" sz="1400"/>
-              <a:t>The tools and algorithms utilized for the CRB Analysis are as follows:</a:t>
+              <a:t>In analyzing the data via Supervised ML</a:t>
             </a:r>
             <a:endParaRPr sz="1400"/>
           </a:p>
@@ -17920,7 +18341,7 @@
             </a:pPr>
             <a:r>
               <a:rPr lang="en" sz="1400"/>
-              <a:t>Jupyter Notebook</a:t>
+              <a:t>Accuracy score: 70%</a:t>
             </a:r>
             <a:endParaRPr sz="1400"/>
           </a:p>
@@ -17930,7 +18351,7 @@
                 <a:spcPct val="90000"/>
               </a:lnSpc>
               <a:spcBef>
-                <a:spcPts val="300"/>
+                <a:spcPts val="0"/>
               </a:spcBef>
               <a:spcAft>
                 <a:spcPts val="0"/>
@@ -17940,7 +18361,7 @@
             </a:pPr>
             <a:r>
               <a:rPr lang="en" sz="1400"/>
-              <a:t>Pandas</a:t>
+              <a:t>Drought Severity Low (0):  precision: 72%, recall 85%</a:t>
             </a:r>
             <a:endParaRPr sz="1400"/>
           </a:p>
@@ -17950,7 +18371,7 @@
                 <a:spcPct val="90000"/>
               </a:lnSpc>
               <a:spcBef>
-                <a:spcPts val="300"/>
+                <a:spcPts val="0"/>
               </a:spcBef>
               <a:spcAft>
                 <a:spcPts val="0"/>
@@ -17960,14 +18381,17 @@
             </a:pPr>
             <a:r>
               <a:rPr lang="en" sz="1400"/>
-              <a:t>PostgreSQL</a:t>
+              <a:t>Drought Severity High (1): precision: 65%, recall 46%</a:t>
             </a:r>
             <a:endParaRPr sz="1400"/>
           </a:p>
           <a:p>
             <a:pPr indent="-317500" lvl="0" marL="457200" rtl="0" algn="l">
-              <a:spcBef>
-                <a:spcPts val="300"/>
+              <a:lnSpc>
+                <a:spcPct val="90000"/>
+              </a:lnSpc>
+              <a:spcBef>
+                <a:spcPts val="0"/>
               </a:spcBef>
               <a:spcAft>
                 <a:spcPts val="0"/>
@@ -17977,27 +18401,7 @@
             </a:pPr>
             <a:r>
               <a:rPr lang="en" sz="1400"/>
-              <a:t>Quick DBD</a:t>
-            </a:r>
-            <a:endParaRPr sz="1400"/>
-          </a:p>
-          <a:p>
-            <a:pPr indent="-317500" lvl="0" marL="457200" rtl="0" algn="l">
-              <a:lnSpc>
-                <a:spcPct val="90000"/>
-              </a:lnSpc>
-              <a:spcBef>
-                <a:spcPts val="0"/>
-              </a:spcBef>
-              <a:spcAft>
-                <a:spcPts val="0"/>
-              </a:spcAft>
-              <a:buSzPts val="1400"/>
-              <a:buChar char="•"/>
-            </a:pPr>
-            <a:r>
-              <a:rPr lang="en" sz="1400"/>
-              <a:t>SKLearn</a:t>
+              <a:t>F1 score: 78%</a:t>
             </a:r>
             <a:endParaRPr sz="1400"/>
           </a:p>
@@ -18007,7 +18411,51 @@
                 <a:spcPct val="90000"/>
               </a:lnSpc>
               <a:spcBef>
-                <a:spcPts val="300"/>
+                <a:spcPts val="200"/>
+              </a:spcBef>
+              <a:spcAft>
+                <a:spcPts val="0"/>
+              </a:spcAft>
+              <a:buClr>
+                <a:schemeClr val="dk1"/>
+              </a:buClr>
+              <a:buSzPts val="1400"/>
+              <a:buNone/>
+            </a:pPr>
+            <a:r>
+              <a:t/>
+            </a:r>
+            <a:endParaRPr sz="1400"/>
+          </a:p>
+          <a:p>
+            <a:pPr indent="0" lvl="0" marL="0" rtl="0" algn="l">
+              <a:lnSpc>
+                <a:spcPct val="90000"/>
+              </a:lnSpc>
+              <a:spcBef>
+                <a:spcPts val="0"/>
+              </a:spcBef>
+              <a:spcAft>
+                <a:spcPts val="0"/>
+              </a:spcAft>
+              <a:buClr>
+                <a:schemeClr val="dk1"/>
+              </a:buClr>
+              <a:buSzPts val="1400"/>
+              <a:buNone/>
+            </a:pPr>
+            <a:r>
+              <a:t/>
+            </a:r>
+            <a:endParaRPr sz="1400"/>
+          </a:p>
+          <a:p>
+            <a:pPr indent="0" lvl="0" marL="0" rtl="0" algn="l">
+              <a:lnSpc>
+                <a:spcPct val="90000"/>
+              </a:lnSpc>
+              <a:spcBef>
+                <a:spcPts val="0"/>
               </a:spcBef>
               <a:spcAft>
                 <a:spcPts val="0"/>
@@ -18027,7 +18475,7 @@
       </p:sp>
       <p:cxnSp>
         <p:nvCxnSpPr>
-          <p:cNvPr id="172" name="Google Shape;172;p30"/>
+          <p:cNvPr id="167" name="Google Shape;167;p29"/>
           <p:cNvCxnSpPr/>
           <p:nvPr/>
         </p:nvCxnSpPr>
@@ -18053,7 +18501,7 @@
       </p:cxnSp>
       <p:cxnSp>
         <p:nvCxnSpPr>
-          <p:cNvPr id="173" name="Google Shape;173;p30"/>
+          <p:cNvPr id="168" name="Google Shape;168;p29"/>
           <p:cNvCxnSpPr/>
           <p:nvPr/>
         </p:nvCxnSpPr>
@@ -18079,7 +18527,1265 @@
       </p:cxnSp>
       <p:sp>
         <p:nvSpPr>
+          <p:cNvPr id="169" name="Google Shape;169;p29"/>
+          <p:cNvSpPr txBox="1"/>
+          <p:nvPr/>
+        </p:nvSpPr>
+        <p:spPr>
+          <a:xfrm>
+            <a:off x="8311243" y="52557"/>
+            <a:ext cx="773700" cy="300000"/>
+          </a:xfrm>
+          <a:prstGeom prst="rect">
+            <a:avLst/>
+          </a:prstGeom>
+          <a:solidFill>
+            <a:srgbClr val="C00000"/>
+          </a:solidFill>
+          <a:ln>
+            <a:noFill/>
+          </a:ln>
+        </p:spPr>
+        <p:txBody>
+          <a:bodyPr anchorCtr="0" anchor="t" bIns="34275" lIns="68575" spcFirstLastPara="1" rIns="68575" wrap="square" tIns="34275">
+            <a:spAutoFit/>
+          </a:bodyPr>
+          <a:lstStyle/>
+          <a:p>
+            <a:pPr indent="0" lvl="0" marL="0" marR="0" rtl="0" algn="l">
+              <a:spcBef>
+                <a:spcPts val="0"/>
+              </a:spcBef>
+              <a:spcAft>
+                <a:spcPts val="0"/>
+              </a:spcAft>
+              <a:buNone/>
+            </a:pPr>
+            <a:r>
+              <a:rPr b="1" lang="en" sz="1500">
+                <a:solidFill>
+                  <a:srgbClr val="F2F2F2"/>
+                </a:solidFill>
+                <a:latin typeface="Calibri"/>
+                <a:ea typeface="Calibri"/>
+                <a:cs typeface="Calibri"/>
+                <a:sym typeface="Calibri"/>
+              </a:rPr>
+              <a:t>DRAFT</a:t>
+            </a:r>
+            <a:endParaRPr sz="1100"/>
+          </a:p>
+        </p:txBody>
+      </p:sp>
+    </p:spTree>
+  </p:cSld>
+  <p:clrMapOvr>
+    <a:masterClrMapping/>
+  </p:clrMapOvr>
+</p:sld>
+</file>
+
+<file path=ppt/slides/slide6.xml><?xml version="1.0" encoding="utf-8"?>
+<p:sld xmlns:a="http://schemas.openxmlformats.org/drawingml/2006/main" xmlns:r="http://schemas.openxmlformats.org/officeDocument/2006/relationships" xmlns:mc="http://schemas.openxmlformats.org/markup-compatibility/2006" xmlns:mv="urn:schemas-microsoft-com:mac:vml" xmlns:p="http://schemas.openxmlformats.org/presentationml/2006/main" xmlns:c="http://schemas.openxmlformats.org/drawingml/2006/chart" xmlns:dgm="http://schemas.openxmlformats.org/drawingml/2006/diagram" xmlns:o="urn:schemas-microsoft-com:office:office" xmlns:v="urn:schemas-microsoft-com:vml" xmlns:pvml="urn:schemas-microsoft-com:office:powerpoint" xmlns:com="http://schemas.openxmlformats.org/drawingml/2006/compatibility" xmlns:p14="http://schemas.microsoft.com/office/powerpoint/2010/main" xmlns:p15="http://schemas.microsoft.com/office/powerpoint/2012/main" xmlns:ahyp="http://schemas.microsoft.com/office/drawing/2018/hyperlinkcolor">
+  <p:cSld>
+    <p:spTree>
+      <p:nvGrpSpPr>
+        <p:cNvPr id="173" name="Shape 173"/>
+        <p:cNvGrpSpPr/>
+        <p:nvPr/>
+      </p:nvGrpSpPr>
+      <p:grpSpPr>
+        <a:xfrm>
+          <a:off x="0" y="0"/>
+          <a:ext cx="0" cy="0"/>
+          <a:chOff x="0" y="0"/>
+          <a:chExt cx="0" cy="0"/>
+        </a:xfrm>
+      </p:grpSpPr>
+      <p:sp>
+        <p:nvSpPr>
           <p:cNvPr id="174" name="Google Shape;174;p30"/>
+          <p:cNvSpPr txBox="1"/>
+          <p:nvPr>
+            <p:ph type="title"/>
+          </p:nvPr>
+        </p:nvSpPr>
+        <p:spPr>
+          <a:xfrm>
+            <a:off x="440867" y="106472"/>
+            <a:ext cx="8303100" cy="620100"/>
+          </a:xfrm>
+          <a:prstGeom prst="rect">
+            <a:avLst/>
+          </a:prstGeom>
+          <a:noFill/>
+          <a:ln>
+            <a:noFill/>
+          </a:ln>
+        </p:spPr>
+        <p:txBody>
+          <a:bodyPr anchorCtr="0" anchor="ctr" bIns="34275" lIns="68575" spcFirstLastPara="1" rIns="68575" wrap="square" tIns="34275">
+            <a:normAutofit/>
+          </a:bodyPr>
+          <a:lstStyle/>
+          <a:p>
+            <a:pPr indent="0" lvl="0" marL="0" rtl="0" algn="l">
+              <a:lnSpc>
+                <a:spcPct val="90000"/>
+              </a:lnSpc>
+              <a:spcBef>
+                <a:spcPts val="0"/>
+              </a:spcBef>
+              <a:spcAft>
+                <a:spcPts val="0"/>
+              </a:spcAft>
+              <a:buClr>
+                <a:srgbClr val="C00000"/>
+              </a:buClr>
+              <a:buSzPts val="2700"/>
+              <a:buFont typeface="Calibri"/>
+              <a:buNone/>
+            </a:pPr>
+            <a:r>
+              <a:rPr lang="en" sz="2700">
+                <a:solidFill>
+                  <a:srgbClr val="C00000"/>
+                </a:solidFill>
+              </a:rPr>
+              <a:t>Data Exploration &amp; Analysis</a:t>
+            </a:r>
+            <a:endParaRPr/>
+          </a:p>
+        </p:txBody>
+      </p:sp>
+      <p:cxnSp>
+        <p:nvCxnSpPr>
+          <p:cNvPr id="175" name="Google Shape;175;p30"/>
+          <p:cNvCxnSpPr/>
+          <p:nvPr/>
+        </p:nvCxnSpPr>
+        <p:spPr>
+          <a:xfrm>
+            <a:off x="510268" y="624569"/>
+            <a:ext cx="8274600" cy="0"/>
+          </a:xfrm>
+          <a:prstGeom prst="straightConnector1">
+            <a:avLst/>
+          </a:prstGeom>
+          <a:noFill/>
+          <a:ln cap="flat" cmpd="sng" w="12700">
+            <a:solidFill>
+              <a:srgbClr val="A5A5A5"/>
+            </a:solidFill>
+            <a:prstDash val="solid"/>
+            <a:miter lim="800000"/>
+            <a:headEnd len="sm" w="sm" type="none"/>
+            <a:tailEnd len="sm" w="sm" type="none"/>
+          </a:ln>
+        </p:spPr>
+      </p:cxnSp>
+      <p:cxnSp>
+        <p:nvCxnSpPr>
+          <p:cNvPr id="176" name="Google Shape;176;p30"/>
+          <p:cNvCxnSpPr/>
+          <p:nvPr/>
+        </p:nvCxnSpPr>
+        <p:spPr>
+          <a:xfrm>
+            <a:off x="510268" y="4788354"/>
+            <a:ext cx="8274600" cy="0"/>
+          </a:xfrm>
+          <a:prstGeom prst="straightConnector1">
+            <a:avLst/>
+          </a:prstGeom>
+          <a:noFill/>
+          <a:ln cap="flat" cmpd="sng" w="12700">
+            <a:solidFill>
+              <a:srgbClr val="A5A5A5"/>
+            </a:solidFill>
+            <a:prstDash val="solid"/>
+            <a:miter lim="800000"/>
+            <a:headEnd len="sm" w="sm" type="none"/>
+            <a:tailEnd len="sm" w="sm" type="none"/>
+          </a:ln>
+        </p:spPr>
+      </p:cxnSp>
+      <p:sp>
+        <p:nvSpPr>
+          <p:cNvPr id="177" name="Google Shape;177;p30"/>
+          <p:cNvSpPr txBox="1"/>
+          <p:nvPr/>
+        </p:nvSpPr>
+        <p:spPr>
+          <a:xfrm>
+            <a:off x="8311243" y="52557"/>
+            <a:ext cx="773700" cy="300000"/>
+          </a:xfrm>
+          <a:prstGeom prst="rect">
+            <a:avLst/>
+          </a:prstGeom>
+          <a:solidFill>
+            <a:srgbClr val="C00000"/>
+          </a:solidFill>
+          <a:ln>
+            <a:noFill/>
+          </a:ln>
+        </p:spPr>
+        <p:txBody>
+          <a:bodyPr anchorCtr="0" anchor="t" bIns="34275" lIns="68575" spcFirstLastPara="1" rIns="68575" wrap="square" tIns="34275">
+            <a:spAutoFit/>
+          </a:bodyPr>
+          <a:lstStyle/>
+          <a:p>
+            <a:pPr indent="0" lvl="0" marL="0" marR="0" rtl="0" algn="l">
+              <a:spcBef>
+                <a:spcPts val="0"/>
+              </a:spcBef>
+              <a:spcAft>
+                <a:spcPts val="0"/>
+              </a:spcAft>
+              <a:buNone/>
+            </a:pPr>
+            <a:r>
+              <a:rPr b="1" lang="en" sz="1500">
+                <a:solidFill>
+                  <a:srgbClr val="F2F2F2"/>
+                </a:solidFill>
+                <a:latin typeface="Calibri"/>
+                <a:ea typeface="Calibri"/>
+                <a:cs typeface="Calibri"/>
+                <a:sym typeface="Calibri"/>
+              </a:rPr>
+              <a:t>DRAFT</a:t>
+            </a:r>
+            <a:endParaRPr sz="1100"/>
+          </a:p>
+        </p:txBody>
+      </p:sp>
+      <p:sp>
+        <p:nvSpPr>
+          <p:cNvPr id="178" name="Google Shape;178;p30"/>
+          <p:cNvSpPr txBox="1"/>
+          <p:nvPr/>
+        </p:nvSpPr>
+        <p:spPr>
+          <a:xfrm>
+            <a:off x="427575" y="4805250"/>
+            <a:ext cx="3359400" cy="338700"/>
+          </a:xfrm>
+          <a:prstGeom prst="rect">
+            <a:avLst/>
+          </a:prstGeom>
+          <a:noFill/>
+          <a:ln>
+            <a:noFill/>
+          </a:ln>
+        </p:spPr>
+        <p:txBody>
+          <a:bodyPr anchorCtr="0" anchor="t" bIns="91425" lIns="91425" spcFirstLastPara="1" rIns="91425" wrap="square" tIns="91425">
+            <a:spAutoFit/>
+          </a:bodyPr>
+          <a:lstStyle/>
+          <a:p>
+            <a:pPr indent="0" lvl="0" marL="0" rtl="0" algn="l">
+              <a:spcBef>
+                <a:spcPts val="0"/>
+              </a:spcBef>
+              <a:spcAft>
+                <a:spcPts val="0"/>
+              </a:spcAft>
+              <a:buNone/>
+            </a:pPr>
+            <a:r>
+              <a:rPr lang="en" sz="1000" u="sng">
+                <a:solidFill>
+                  <a:schemeClr val="hlink"/>
+                </a:solidFill>
+                <a:latin typeface="Calibri"/>
+                <a:ea typeface="Calibri"/>
+                <a:cs typeface="Calibri"/>
+                <a:sym typeface="Calibri"/>
+                <a:hlinkClick r:id="rId3"/>
+              </a:rPr>
+              <a:t>Tableau Storybook Analysis Link </a:t>
+            </a:r>
+            <a:endParaRPr sz="1000">
+              <a:latin typeface="Calibri"/>
+              <a:ea typeface="Calibri"/>
+              <a:cs typeface="Calibri"/>
+              <a:sym typeface="Calibri"/>
+            </a:endParaRPr>
+          </a:p>
+        </p:txBody>
+      </p:sp>
+      <p:pic>
+        <p:nvPicPr>
+          <p:cNvPr id="179" name="Google Shape;179;p30"/>
+          <p:cNvPicPr preferRelativeResize="0"/>
+          <p:nvPr/>
+        </p:nvPicPr>
+        <p:blipFill>
+          <a:blip r:embed="rId4">
+            <a:alphaModFix/>
+          </a:blip>
+          <a:stretch>
+            <a:fillRect/>
+          </a:stretch>
+        </p:blipFill>
+        <p:spPr>
+          <a:xfrm>
+            <a:off x="510275" y="699400"/>
+            <a:ext cx="5104197" cy="4004499"/>
+          </a:xfrm>
+          <a:prstGeom prst="rect">
+            <a:avLst/>
+          </a:prstGeom>
+          <a:noFill/>
+          <a:ln>
+            <a:noFill/>
+          </a:ln>
+        </p:spPr>
+      </p:pic>
+      <p:sp>
+        <p:nvSpPr>
+          <p:cNvPr id="180" name="Google Shape;180;p30"/>
+          <p:cNvSpPr txBox="1"/>
+          <p:nvPr/>
+        </p:nvSpPr>
+        <p:spPr>
+          <a:xfrm>
+            <a:off x="6034450" y="1239325"/>
+            <a:ext cx="2750400" cy="2724300"/>
+          </a:xfrm>
+          <a:prstGeom prst="rect">
+            <a:avLst/>
+          </a:prstGeom>
+          <a:noFill/>
+          <a:ln>
+            <a:noFill/>
+          </a:ln>
+        </p:spPr>
+        <p:txBody>
+          <a:bodyPr anchorCtr="0" anchor="t" bIns="91425" lIns="91425" spcFirstLastPara="1" rIns="91425" wrap="square" tIns="91425">
+            <a:spAutoFit/>
+          </a:bodyPr>
+          <a:lstStyle/>
+          <a:p>
+            <a:pPr indent="0" lvl="0" marL="0" rtl="0" algn="l">
+              <a:spcBef>
+                <a:spcPts val="0"/>
+              </a:spcBef>
+              <a:spcAft>
+                <a:spcPts val="0"/>
+              </a:spcAft>
+              <a:buNone/>
+            </a:pPr>
+            <a:r>
+              <a:rPr lang="en">
+                <a:latin typeface="Calibri"/>
+                <a:ea typeface="Calibri"/>
+                <a:cs typeface="Calibri"/>
+                <a:sym typeface="Calibri"/>
+              </a:rPr>
+              <a:t>Based on the analysis,</a:t>
+            </a:r>
+            <a:endParaRPr>
+              <a:latin typeface="Calibri"/>
+              <a:ea typeface="Calibri"/>
+              <a:cs typeface="Calibri"/>
+              <a:sym typeface="Calibri"/>
+            </a:endParaRPr>
+          </a:p>
+          <a:p>
+            <a:pPr indent="-311150" lvl="0" marL="457200" rtl="0" algn="l">
+              <a:spcBef>
+                <a:spcPts val="0"/>
+              </a:spcBef>
+              <a:spcAft>
+                <a:spcPts val="0"/>
+              </a:spcAft>
+              <a:buSzPts val="1300"/>
+              <a:buFont typeface="Calibri"/>
+              <a:buChar char="●"/>
+            </a:pPr>
+            <a:r>
+              <a:rPr lang="en" sz="1300">
+                <a:latin typeface="Calibri"/>
+                <a:ea typeface="Calibri"/>
+                <a:cs typeface="Calibri"/>
+                <a:sym typeface="Calibri"/>
+              </a:rPr>
+              <a:t>Snowpack levels are high, the Drought conditions are low.</a:t>
+            </a:r>
+            <a:endParaRPr sz="1300">
+              <a:latin typeface="Calibri"/>
+              <a:ea typeface="Calibri"/>
+              <a:cs typeface="Calibri"/>
+              <a:sym typeface="Calibri"/>
+            </a:endParaRPr>
+          </a:p>
+          <a:p>
+            <a:pPr indent="-311150" lvl="0" marL="457200" rtl="0" algn="l">
+              <a:spcBef>
+                <a:spcPts val="300"/>
+              </a:spcBef>
+              <a:spcAft>
+                <a:spcPts val="0"/>
+              </a:spcAft>
+              <a:buSzPts val="1300"/>
+              <a:buFont typeface="Calibri"/>
+              <a:buChar char="●"/>
+            </a:pPr>
+            <a:r>
+              <a:rPr lang="en" sz="1300">
+                <a:solidFill>
+                  <a:schemeClr val="dk1"/>
+                </a:solidFill>
+                <a:latin typeface="Calibri"/>
+                <a:ea typeface="Calibri"/>
+                <a:cs typeface="Calibri"/>
+                <a:sym typeface="Calibri"/>
+              </a:rPr>
+              <a:t>Snowpack levels are low, the Drought conditions are high.</a:t>
+            </a:r>
+            <a:endParaRPr sz="1300">
+              <a:solidFill>
+                <a:schemeClr val="dk1"/>
+              </a:solidFill>
+              <a:latin typeface="Calibri"/>
+              <a:ea typeface="Calibri"/>
+              <a:cs typeface="Calibri"/>
+              <a:sym typeface="Calibri"/>
+            </a:endParaRPr>
+          </a:p>
+          <a:p>
+            <a:pPr indent="0" lvl="0" marL="0" rtl="0" algn="l">
+              <a:spcBef>
+                <a:spcPts val="0"/>
+              </a:spcBef>
+              <a:spcAft>
+                <a:spcPts val="0"/>
+              </a:spcAft>
+              <a:buNone/>
+            </a:pPr>
+            <a:r>
+              <a:t/>
+            </a:r>
+            <a:endParaRPr>
+              <a:solidFill>
+                <a:schemeClr val="dk1"/>
+              </a:solidFill>
+              <a:latin typeface="Calibri"/>
+              <a:ea typeface="Calibri"/>
+              <a:cs typeface="Calibri"/>
+              <a:sym typeface="Calibri"/>
+            </a:endParaRPr>
+          </a:p>
+          <a:p>
+            <a:pPr indent="0" lvl="0" marL="0" rtl="0" algn="l">
+              <a:spcBef>
+                <a:spcPts val="0"/>
+              </a:spcBef>
+              <a:spcAft>
+                <a:spcPts val="0"/>
+              </a:spcAft>
+              <a:buNone/>
+            </a:pPr>
+            <a:r>
+              <a:rPr lang="en">
+                <a:solidFill>
+                  <a:schemeClr val="dk1"/>
+                </a:solidFill>
+                <a:latin typeface="Calibri"/>
+                <a:ea typeface="Calibri"/>
+                <a:cs typeface="Calibri"/>
+                <a:sym typeface="Calibri"/>
+              </a:rPr>
+              <a:t>The same holds true as it relates to the Lake Storage levels.  </a:t>
+            </a:r>
+            <a:endParaRPr>
+              <a:solidFill>
+                <a:schemeClr val="dk1"/>
+              </a:solidFill>
+              <a:latin typeface="Calibri"/>
+              <a:ea typeface="Calibri"/>
+              <a:cs typeface="Calibri"/>
+              <a:sym typeface="Calibri"/>
+            </a:endParaRPr>
+          </a:p>
+          <a:p>
+            <a:pPr indent="-311150" lvl="0" marL="457200" rtl="0" algn="l">
+              <a:spcBef>
+                <a:spcPts val="0"/>
+              </a:spcBef>
+              <a:spcAft>
+                <a:spcPts val="0"/>
+              </a:spcAft>
+              <a:buClr>
+                <a:schemeClr val="dk1"/>
+              </a:buClr>
+              <a:buSzPts val="1300"/>
+              <a:buFont typeface="Calibri"/>
+              <a:buChar char="●"/>
+            </a:pPr>
+            <a:r>
+              <a:rPr lang="en" sz="1300">
+                <a:solidFill>
+                  <a:schemeClr val="dk1"/>
+                </a:solidFill>
+                <a:latin typeface="Calibri"/>
+                <a:ea typeface="Calibri"/>
+                <a:cs typeface="Calibri"/>
+                <a:sym typeface="Calibri"/>
+              </a:rPr>
+              <a:t>Lake Storage levels are high, the Drought conditions are low.  </a:t>
+            </a:r>
+            <a:endParaRPr sz="1300">
+              <a:solidFill>
+                <a:schemeClr val="dk1"/>
+              </a:solidFill>
+              <a:latin typeface="Calibri"/>
+              <a:ea typeface="Calibri"/>
+              <a:cs typeface="Calibri"/>
+              <a:sym typeface="Calibri"/>
+            </a:endParaRPr>
+          </a:p>
+          <a:p>
+            <a:pPr indent="-311150" lvl="0" marL="457200" rtl="0" algn="l">
+              <a:spcBef>
+                <a:spcPts val="300"/>
+              </a:spcBef>
+              <a:spcAft>
+                <a:spcPts val="0"/>
+              </a:spcAft>
+              <a:buClr>
+                <a:schemeClr val="dk1"/>
+              </a:buClr>
+              <a:buSzPts val="1300"/>
+              <a:buFont typeface="Calibri"/>
+              <a:buChar char="●"/>
+            </a:pPr>
+            <a:r>
+              <a:rPr lang="en" sz="1300">
+                <a:solidFill>
+                  <a:schemeClr val="dk1"/>
+                </a:solidFill>
+                <a:latin typeface="Calibri"/>
+                <a:ea typeface="Calibri"/>
+                <a:cs typeface="Calibri"/>
+                <a:sym typeface="Calibri"/>
+              </a:rPr>
+              <a:t>Lake Storage levels are low, the Drought conditions are high.</a:t>
+            </a:r>
+            <a:endParaRPr sz="1300">
+              <a:solidFill>
+                <a:schemeClr val="dk1"/>
+              </a:solidFill>
+              <a:latin typeface="Calibri"/>
+              <a:ea typeface="Calibri"/>
+              <a:cs typeface="Calibri"/>
+              <a:sym typeface="Calibri"/>
+            </a:endParaRPr>
+          </a:p>
+        </p:txBody>
+      </p:sp>
+    </p:spTree>
+  </p:cSld>
+  <p:clrMapOvr>
+    <a:masterClrMapping/>
+  </p:clrMapOvr>
+</p:sld>
+</file>
+
+<file path=ppt/slides/slide7.xml><?xml version="1.0" encoding="utf-8"?>
+<p:sld xmlns:a="http://schemas.openxmlformats.org/drawingml/2006/main" xmlns:r="http://schemas.openxmlformats.org/officeDocument/2006/relationships" xmlns:mc="http://schemas.openxmlformats.org/markup-compatibility/2006" xmlns:mv="urn:schemas-microsoft-com:mac:vml" xmlns:p="http://schemas.openxmlformats.org/presentationml/2006/main" xmlns:c="http://schemas.openxmlformats.org/drawingml/2006/chart" xmlns:dgm="http://schemas.openxmlformats.org/drawingml/2006/diagram" xmlns:o="urn:schemas-microsoft-com:office:office" xmlns:v="urn:schemas-microsoft-com:vml" xmlns:pvml="urn:schemas-microsoft-com:office:powerpoint" xmlns:com="http://schemas.openxmlformats.org/drawingml/2006/compatibility" xmlns:p14="http://schemas.microsoft.com/office/powerpoint/2010/main" xmlns:p15="http://schemas.microsoft.com/office/powerpoint/2012/main" xmlns:ahyp="http://schemas.microsoft.com/office/drawing/2018/hyperlinkcolor">
+  <p:cSld>
+    <p:spTree>
+      <p:nvGrpSpPr>
+        <p:cNvPr id="184" name="Shape 184"/>
+        <p:cNvGrpSpPr/>
+        <p:nvPr/>
+      </p:nvGrpSpPr>
+      <p:grpSpPr>
+        <a:xfrm>
+          <a:off x="0" y="0"/>
+          <a:ext cx="0" cy="0"/>
+          <a:chOff x="0" y="0"/>
+          <a:chExt cx="0" cy="0"/>
+        </a:xfrm>
+      </p:grpSpPr>
+      <p:sp>
+        <p:nvSpPr>
+          <p:cNvPr id="185" name="Google Shape;185;p31"/>
+          <p:cNvSpPr txBox="1"/>
+          <p:nvPr>
+            <p:ph type="title"/>
+          </p:nvPr>
+        </p:nvSpPr>
+        <p:spPr>
+          <a:xfrm>
+            <a:off x="440867" y="106472"/>
+            <a:ext cx="8303100" cy="620100"/>
+          </a:xfrm>
+          <a:prstGeom prst="rect">
+            <a:avLst/>
+          </a:prstGeom>
+          <a:noFill/>
+          <a:ln>
+            <a:noFill/>
+          </a:ln>
+        </p:spPr>
+        <p:txBody>
+          <a:bodyPr anchorCtr="0" anchor="ctr" bIns="34275" lIns="68575" spcFirstLastPara="1" rIns="68575" wrap="square" tIns="34275">
+            <a:normAutofit/>
+          </a:bodyPr>
+          <a:lstStyle/>
+          <a:p>
+            <a:pPr indent="0" lvl="0" marL="0" rtl="0" algn="l">
+              <a:lnSpc>
+                <a:spcPct val="90000"/>
+              </a:lnSpc>
+              <a:spcBef>
+                <a:spcPts val="0"/>
+              </a:spcBef>
+              <a:spcAft>
+                <a:spcPts val="0"/>
+              </a:spcAft>
+              <a:buClr>
+                <a:srgbClr val="C00000"/>
+              </a:buClr>
+              <a:buSzPts val="2700"/>
+              <a:buFont typeface="Calibri"/>
+              <a:buNone/>
+            </a:pPr>
+            <a:r>
+              <a:rPr lang="en" sz="2700">
+                <a:solidFill>
+                  <a:srgbClr val="C00000"/>
+                </a:solidFill>
+              </a:rPr>
+              <a:t>Summary</a:t>
+            </a:r>
+            <a:endParaRPr/>
+          </a:p>
+        </p:txBody>
+      </p:sp>
+      <p:sp>
+        <p:nvSpPr>
+          <p:cNvPr id="186" name="Google Shape;186;p31"/>
+          <p:cNvSpPr txBox="1"/>
+          <p:nvPr>
+            <p:ph idx="1" type="body"/>
+          </p:nvPr>
+        </p:nvSpPr>
+        <p:spPr>
+          <a:xfrm>
+            <a:off x="440867" y="771524"/>
+            <a:ext cx="8303100" cy="3861300"/>
+          </a:xfrm>
+          <a:prstGeom prst="rect">
+            <a:avLst/>
+          </a:prstGeom>
+          <a:noFill/>
+          <a:ln>
+            <a:noFill/>
+          </a:ln>
+        </p:spPr>
+        <p:txBody>
+          <a:bodyPr anchorCtr="0" anchor="t" bIns="34275" lIns="68575" spcFirstLastPara="1" rIns="68575" wrap="square" tIns="34275">
+            <a:normAutofit/>
+          </a:bodyPr>
+          <a:lstStyle/>
+          <a:p>
+            <a:pPr indent="0" lvl="0" marL="0" rtl="0" algn="l">
+              <a:lnSpc>
+                <a:spcPct val="90000"/>
+              </a:lnSpc>
+              <a:spcBef>
+                <a:spcPts val="200"/>
+              </a:spcBef>
+              <a:spcAft>
+                <a:spcPts val="0"/>
+              </a:spcAft>
+              <a:buClr>
+                <a:schemeClr val="dk1"/>
+              </a:buClr>
+              <a:buSzPts val="1400"/>
+              <a:buNone/>
+            </a:pPr>
+            <a:r>
+              <a:rPr lang="en" sz="1400"/>
+              <a:t>The Colorado River Basin is a complex region with high population growth in many of the metro areas as well as expansive agriculture areas that both depend on and use the river water. There are most likely other features that when added to the dataset could enhance and improve the machine learning component to better predict severe-to-worse-drought for this region. In particular, it would be ideal to find features that could improve the recall (sensitivity) value for predicting severe-to-worse-drought because even when predicted true with an actual false outcome it would trigger the region to conserve water usage as a reaction to the prediction. Having a solid drought prediction model would better prepare the region for water conservation action during periods of drought or non-drought.</a:t>
+            </a:r>
+            <a:endParaRPr sz="1400"/>
+          </a:p>
+          <a:p>
+            <a:pPr indent="0" lvl="0" marL="0" rtl="0" algn="l">
+              <a:lnSpc>
+                <a:spcPct val="90000"/>
+              </a:lnSpc>
+              <a:spcBef>
+                <a:spcPts val="200"/>
+              </a:spcBef>
+              <a:spcAft>
+                <a:spcPts val="0"/>
+              </a:spcAft>
+              <a:buClr>
+                <a:schemeClr val="dk1"/>
+              </a:buClr>
+              <a:buSzPts val="1400"/>
+              <a:buNone/>
+            </a:pPr>
+            <a:r>
+              <a:t/>
+            </a:r>
+            <a:endParaRPr sz="1400"/>
+          </a:p>
+          <a:p>
+            <a:pPr indent="0" lvl="0" marL="0" rtl="0" algn="l">
+              <a:lnSpc>
+                <a:spcPct val="90000"/>
+              </a:lnSpc>
+              <a:spcBef>
+                <a:spcPts val="0"/>
+              </a:spcBef>
+              <a:spcAft>
+                <a:spcPts val="0"/>
+              </a:spcAft>
+              <a:buClr>
+                <a:schemeClr val="dk1"/>
+              </a:buClr>
+              <a:buSzPts val="1400"/>
+              <a:buNone/>
+            </a:pPr>
+            <a:r>
+              <a:t/>
+            </a:r>
+            <a:endParaRPr/>
+          </a:p>
+          <a:p>
+            <a:pPr indent="0" lvl="0" marL="0" rtl="0" algn="l">
+              <a:lnSpc>
+                <a:spcPct val="90000"/>
+              </a:lnSpc>
+              <a:spcBef>
+                <a:spcPts val="0"/>
+              </a:spcBef>
+              <a:spcAft>
+                <a:spcPts val="0"/>
+              </a:spcAft>
+              <a:buClr>
+                <a:schemeClr val="dk1"/>
+              </a:buClr>
+              <a:buSzPts val="1400"/>
+              <a:buNone/>
+            </a:pPr>
+            <a:r>
+              <a:t/>
+            </a:r>
+            <a:endParaRPr b="1" sz="1400"/>
+          </a:p>
+        </p:txBody>
+      </p:sp>
+      <p:cxnSp>
+        <p:nvCxnSpPr>
+          <p:cNvPr id="187" name="Google Shape;187;p31"/>
+          <p:cNvCxnSpPr/>
+          <p:nvPr/>
+        </p:nvCxnSpPr>
+        <p:spPr>
+          <a:xfrm>
+            <a:off x="510268" y="624569"/>
+            <a:ext cx="8274600" cy="0"/>
+          </a:xfrm>
+          <a:prstGeom prst="straightConnector1">
+            <a:avLst/>
+          </a:prstGeom>
+          <a:noFill/>
+          <a:ln cap="flat" cmpd="sng" w="12700">
+            <a:solidFill>
+              <a:srgbClr val="A5A5A5"/>
+            </a:solidFill>
+            <a:prstDash val="solid"/>
+            <a:miter lim="800000"/>
+            <a:headEnd len="sm" w="sm" type="none"/>
+            <a:tailEnd len="sm" w="sm" type="none"/>
+          </a:ln>
+        </p:spPr>
+      </p:cxnSp>
+      <p:cxnSp>
+        <p:nvCxnSpPr>
+          <p:cNvPr id="188" name="Google Shape;188;p31"/>
+          <p:cNvCxnSpPr/>
+          <p:nvPr/>
+        </p:nvCxnSpPr>
+        <p:spPr>
+          <a:xfrm>
+            <a:off x="510268" y="4788354"/>
+            <a:ext cx="8274600" cy="0"/>
+          </a:xfrm>
+          <a:prstGeom prst="straightConnector1">
+            <a:avLst/>
+          </a:prstGeom>
+          <a:noFill/>
+          <a:ln cap="flat" cmpd="sng" w="12700">
+            <a:solidFill>
+              <a:srgbClr val="A5A5A5"/>
+            </a:solidFill>
+            <a:prstDash val="solid"/>
+            <a:miter lim="800000"/>
+            <a:headEnd len="sm" w="sm" type="none"/>
+            <a:tailEnd len="sm" w="sm" type="none"/>
+          </a:ln>
+        </p:spPr>
+      </p:cxnSp>
+      <p:sp>
+        <p:nvSpPr>
+          <p:cNvPr id="189" name="Google Shape;189;p31"/>
+          <p:cNvSpPr txBox="1"/>
+          <p:nvPr/>
+        </p:nvSpPr>
+        <p:spPr>
+          <a:xfrm>
+            <a:off x="8311243" y="52557"/>
+            <a:ext cx="773700" cy="300000"/>
+          </a:xfrm>
+          <a:prstGeom prst="rect">
+            <a:avLst/>
+          </a:prstGeom>
+          <a:solidFill>
+            <a:srgbClr val="C00000"/>
+          </a:solidFill>
+          <a:ln>
+            <a:noFill/>
+          </a:ln>
+        </p:spPr>
+        <p:txBody>
+          <a:bodyPr anchorCtr="0" anchor="t" bIns="34275" lIns="68575" spcFirstLastPara="1" rIns="68575" wrap="square" tIns="34275">
+            <a:spAutoFit/>
+          </a:bodyPr>
+          <a:lstStyle/>
+          <a:p>
+            <a:pPr indent="0" lvl="0" marL="0" marR="0" rtl="0" algn="l">
+              <a:spcBef>
+                <a:spcPts val="0"/>
+              </a:spcBef>
+              <a:spcAft>
+                <a:spcPts val="0"/>
+              </a:spcAft>
+              <a:buNone/>
+            </a:pPr>
+            <a:r>
+              <a:rPr b="1" lang="en" sz="1500">
+                <a:solidFill>
+                  <a:srgbClr val="F2F2F2"/>
+                </a:solidFill>
+                <a:latin typeface="Calibri"/>
+                <a:ea typeface="Calibri"/>
+                <a:cs typeface="Calibri"/>
+                <a:sym typeface="Calibri"/>
+              </a:rPr>
+              <a:t>DRAFT</a:t>
+            </a:r>
+            <a:endParaRPr sz="1100"/>
+          </a:p>
+        </p:txBody>
+      </p:sp>
+    </p:spTree>
+  </p:cSld>
+  <p:clrMapOvr>
+    <a:masterClrMapping/>
+  </p:clrMapOvr>
+</p:sld>
+</file>
+
+<file path=ppt/slides/slide8.xml><?xml version="1.0" encoding="utf-8"?>
+<p:sld xmlns:a="http://schemas.openxmlformats.org/drawingml/2006/main" xmlns:r="http://schemas.openxmlformats.org/officeDocument/2006/relationships" xmlns:mc="http://schemas.openxmlformats.org/markup-compatibility/2006" xmlns:mv="urn:schemas-microsoft-com:mac:vml" xmlns:p="http://schemas.openxmlformats.org/presentationml/2006/main" xmlns:c="http://schemas.openxmlformats.org/drawingml/2006/chart" xmlns:dgm="http://schemas.openxmlformats.org/drawingml/2006/diagram" xmlns:o="urn:schemas-microsoft-com:office:office" xmlns:v="urn:schemas-microsoft-com:vml" xmlns:pvml="urn:schemas-microsoft-com:office:powerpoint" xmlns:com="http://schemas.openxmlformats.org/drawingml/2006/compatibility" xmlns:p14="http://schemas.microsoft.com/office/powerpoint/2010/main" xmlns:p15="http://schemas.microsoft.com/office/powerpoint/2012/main" xmlns:ahyp="http://schemas.microsoft.com/office/drawing/2018/hyperlinkcolor">
+  <p:cSld>
+    <p:bg>
+      <p:bgPr>
+        <a:solidFill>
+          <a:srgbClr val="FCE5CD"/>
+        </a:solidFill>
+      </p:bgPr>
+    </p:bg>
+    <p:spTree>
+      <p:nvGrpSpPr>
+        <p:cNvPr id="193" name="Shape 193"/>
+        <p:cNvGrpSpPr/>
+        <p:nvPr/>
+      </p:nvGrpSpPr>
+      <p:grpSpPr>
+        <a:xfrm>
+          <a:off x="0" y="0"/>
+          <a:ext cx="0" cy="0"/>
+          <a:chOff x="0" y="0"/>
+          <a:chExt cx="0" cy="0"/>
+        </a:xfrm>
+      </p:grpSpPr>
+      <p:sp>
+        <p:nvSpPr>
+          <p:cNvPr id="194" name="Google Shape;194;p32"/>
+          <p:cNvSpPr txBox="1"/>
+          <p:nvPr>
+            <p:ph type="title"/>
+          </p:nvPr>
+        </p:nvSpPr>
+        <p:spPr>
+          <a:xfrm>
+            <a:off x="628650" y="273844"/>
+            <a:ext cx="7886700" cy="994200"/>
+          </a:xfrm>
+          <a:prstGeom prst="rect">
+            <a:avLst/>
+          </a:prstGeom>
+        </p:spPr>
+        <p:txBody>
+          <a:bodyPr anchorCtr="0" anchor="ctr" bIns="34275" lIns="68575" spcFirstLastPara="1" rIns="68575" wrap="square" tIns="34275">
+            <a:normAutofit/>
+          </a:bodyPr>
+          <a:lstStyle/>
+          <a:p>
+            <a:pPr indent="0" lvl="0" marL="0" rtl="0" algn="l">
+              <a:spcBef>
+                <a:spcPts val="0"/>
+              </a:spcBef>
+              <a:spcAft>
+                <a:spcPts val="0"/>
+              </a:spcAft>
+              <a:buNone/>
+            </a:pPr>
+            <a:r>
+              <a:rPr lang="en"/>
+              <a:t>Appendix</a:t>
+            </a:r>
+            <a:endParaRPr/>
+          </a:p>
+        </p:txBody>
+      </p:sp>
+    </p:spTree>
+  </p:cSld>
+  <p:clrMapOvr>
+    <a:masterClrMapping/>
+  </p:clrMapOvr>
+</p:sld>
+</file>
+
+<file path=ppt/slides/slide9.xml><?xml version="1.0" encoding="utf-8"?>
+<p:sld xmlns:a="http://schemas.openxmlformats.org/drawingml/2006/main" xmlns:r="http://schemas.openxmlformats.org/officeDocument/2006/relationships" xmlns:mc="http://schemas.openxmlformats.org/markup-compatibility/2006" xmlns:mv="urn:schemas-microsoft-com:mac:vml" xmlns:p="http://schemas.openxmlformats.org/presentationml/2006/main" xmlns:c="http://schemas.openxmlformats.org/drawingml/2006/chart" xmlns:dgm="http://schemas.openxmlformats.org/drawingml/2006/diagram" xmlns:o="urn:schemas-microsoft-com:office:office" xmlns:v="urn:schemas-microsoft-com:vml" xmlns:pvml="urn:schemas-microsoft-com:office:powerpoint" xmlns:com="http://schemas.openxmlformats.org/drawingml/2006/compatibility" xmlns:p14="http://schemas.microsoft.com/office/powerpoint/2010/main" xmlns:p15="http://schemas.microsoft.com/office/powerpoint/2012/main" xmlns:ahyp="http://schemas.microsoft.com/office/drawing/2018/hyperlinkcolor">
+  <p:cSld>
+    <p:spTree>
+      <p:nvGrpSpPr>
+        <p:cNvPr id="198" name="Shape 198"/>
+        <p:cNvGrpSpPr/>
+        <p:nvPr/>
+      </p:nvGrpSpPr>
+      <p:grpSpPr>
+        <a:xfrm>
+          <a:off x="0" y="0"/>
+          <a:ext cx="0" cy="0"/>
+          <a:chOff x="0" y="0"/>
+          <a:chExt cx="0" cy="0"/>
+        </a:xfrm>
+      </p:grpSpPr>
+      <p:sp>
+        <p:nvSpPr>
+          <p:cNvPr id="199" name="Google Shape;199;p33"/>
+          <p:cNvSpPr txBox="1"/>
+          <p:nvPr>
+            <p:ph type="title"/>
+          </p:nvPr>
+        </p:nvSpPr>
+        <p:spPr>
+          <a:xfrm>
+            <a:off x="440867" y="106472"/>
+            <a:ext cx="8303100" cy="620100"/>
+          </a:xfrm>
+          <a:prstGeom prst="rect">
+            <a:avLst/>
+          </a:prstGeom>
+          <a:noFill/>
+          <a:ln>
+            <a:noFill/>
+          </a:ln>
+        </p:spPr>
+        <p:txBody>
+          <a:bodyPr anchorCtr="0" anchor="ctr" bIns="34275" lIns="68575" spcFirstLastPara="1" rIns="68575" wrap="square" tIns="34275">
+            <a:normAutofit/>
+          </a:bodyPr>
+          <a:lstStyle/>
+          <a:p>
+            <a:pPr indent="0" lvl="0" marL="0" rtl="0" algn="l">
+              <a:lnSpc>
+                <a:spcPct val="90000"/>
+              </a:lnSpc>
+              <a:spcBef>
+                <a:spcPts val="0"/>
+              </a:spcBef>
+              <a:spcAft>
+                <a:spcPts val="0"/>
+              </a:spcAft>
+              <a:buClr>
+                <a:srgbClr val="C00000"/>
+              </a:buClr>
+              <a:buSzPts val="2700"/>
+              <a:buFont typeface="Calibri"/>
+              <a:buNone/>
+            </a:pPr>
+            <a:r>
+              <a:rPr lang="en" sz="2700">
+                <a:solidFill>
+                  <a:srgbClr val="C00000"/>
+                </a:solidFill>
+              </a:rPr>
+              <a:t>Technology and Algorithms</a:t>
+            </a:r>
+            <a:endParaRPr/>
+          </a:p>
+        </p:txBody>
+      </p:sp>
+      <p:sp>
+        <p:nvSpPr>
+          <p:cNvPr id="200" name="Google Shape;200;p33"/>
+          <p:cNvSpPr txBox="1"/>
+          <p:nvPr>
+            <p:ph idx="1" type="body"/>
+          </p:nvPr>
+        </p:nvSpPr>
+        <p:spPr>
+          <a:xfrm>
+            <a:off x="440867" y="771524"/>
+            <a:ext cx="8303100" cy="3861300"/>
+          </a:xfrm>
+          <a:prstGeom prst="rect">
+            <a:avLst/>
+          </a:prstGeom>
+          <a:noFill/>
+          <a:ln>
+            <a:noFill/>
+          </a:ln>
+        </p:spPr>
+        <p:txBody>
+          <a:bodyPr anchorCtr="0" anchor="t" bIns="34275" lIns="68575" spcFirstLastPara="1" rIns="68575" wrap="square" tIns="34275">
+            <a:normAutofit/>
+          </a:bodyPr>
+          <a:lstStyle/>
+          <a:p>
+            <a:pPr indent="0" lvl="0" marL="0" rtl="0" algn="l">
+              <a:lnSpc>
+                <a:spcPct val="90000"/>
+              </a:lnSpc>
+              <a:spcBef>
+                <a:spcPts val="200"/>
+              </a:spcBef>
+              <a:spcAft>
+                <a:spcPts val="0"/>
+              </a:spcAft>
+              <a:buClr>
+                <a:schemeClr val="dk1"/>
+              </a:buClr>
+              <a:buSzPts val="1400"/>
+              <a:buNone/>
+            </a:pPr>
+            <a:r>
+              <a:rPr lang="en" sz="1400"/>
+              <a:t>The tools and algorithms utilized for the CRB Analysis are as follows:</a:t>
+            </a:r>
+            <a:endParaRPr sz="1400"/>
+          </a:p>
+          <a:p>
+            <a:pPr indent="-317500" lvl="0" marL="457200" rtl="0" algn="l">
+              <a:lnSpc>
+                <a:spcPct val="90000"/>
+              </a:lnSpc>
+              <a:spcBef>
+                <a:spcPts val="200"/>
+              </a:spcBef>
+              <a:spcAft>
+                <a:spcPts val="0"/>
+              </a:spcAft>
+              <a:buSzPts val="1400"/>
+              <a:buChar char="•"/>
+            </a:pPr>
+            <a:r>
+              <a:rPr lang="en" sz="1400"/>
+              <a:t>Jupyter Notebook</a:t>
+            </a:r>
+            <a:endParaRPr sz="1400"/>
+          </a:p>
+          <a:p>
+            <a:pPr indent="-317500" lvl="0" marL="457200" rtl="0" algn="l">
+              <a:lnSpc>
+                <a:spcPct val="90000"/>
+              </a:lnSpc>
+              <a:spcBef>
+                <a:spcPts val="300"/>
+              </a:spcBef>
+              <a:spcAft>
+                <a:spcPts val="0"/>
+              </a:spcAft>
+              <a:buSzPts val="1400"/>
+              <a:buChar char="•"/>
+            </a:pPr>
+            <a:r>
+              <a:rPr lang="en" sz="1400"/>
+              <a:t>Pandas</a:t>
+            </a:r>
+            <a:endParaRPr sz="1400"/>
+          </a:p>
+          <a:p>
+            <a:pPr indent="-317500" lvl="0" marL="457200" rtl="0" algn="l">
+              <a:lnSpc>
+                <a:spcPct val="90000"/>
+              </a:lnSpc>
+              <a:spcBef>
+                <a:spcPts val="300"/>
+              </a:spcBef>
+              <a:spcAft>
+                <a:spcPts val="0"/>
+              </a:spcAft>
+              <a:buSzPts val="1400"/>
+              <a:buChar char="•"/>
+            </a:pPr>
+            <a:r>
+              <a:rPr lang="en" sz="1400"/>
+              <a:t>PostgreSQL</a:t>
+            </a:r>
+            <a:endParaRPr sz="1400"/>
+          </a:p>
+          <a:p>
+            <a:pPr indent="-317500" lvl="0" marL="457200" rtl="0" algn="l">
+              <a:spcBef>
+                <a:spcPts val="300"/>
+              </a:spcBef>
+              <a:spcAft>
+                <a:spcPts val="0"/>
+              </a:spcAft>
+              <a:buSzPts val="1400"/>
+              <a:buChar char="•"/>
+            </a:pPr>
+            <a:r>
+              <a:rPr lang="en" sz="1400"/>
+              <a:t>Quick DBD </a:t>
+            </a:r>
+            <a:endParaRPr sz="1400"/>
+          </a:p>
+          <a:p>
+            <a:pPr indent="-317500" lvl="0" marL="457200" rtl="0" algn="l">
+              <a:spcBef>
+                <a:spcPts val="0"/>
+              </a:spcBef>
+              <a:spcAft>
+                <a:spcPts val="0"/>
+              </a:spcAft>
+              <a:buSzPts val="1400"/>
+              <a:buChar char="•"/>
+            </a:pPr>
+            <a:r>
+              <a:rPr lang="en" sz="1400"/>
+              <a:t>Tableau</a:t>
+            </a:r>
+            <a:endParaRPr sz="1400"/>
+          </a:p>
+          <a:p>
+            <a:pPr indent="-317500" lvl="0" marL="457200" rtl="0" algn="l">
+              <a:lnSpc>
+                <a:spcPct val="90000"/>
+              </a:lnSpc>
+              <a:spcBef>
+                <a:spcPts val="0"/>
+              </a:spcBef>
+              <a:spcAft>
+                <a:spcPts val="0"/>
+              </a:spcAft>
+              <a:buSzPts val="1400"/>
+              <a:buChar char="•"/>
+            </a:pPr>
+            <a:r>
+              <a:rPr lang="en" sz="1400"/>
+              <a:t>SKLearn</a:t>
+            </a:r>
+            <a:endParaRPr sz="1400"/>
+          </a:p>
+          <a:p>
+            <a:pPr indent="0" lvl="0" marL="0" rtl="0" algn="l">
+              <a:lnSpc>
+                <a:spcPct val="90000"/>
+              </a:lnSpc>
+              <a:spcBef>
+                <a:spcPts val="300"/>
+              </a:spcBef>
+              <a:spcAft>
+                <a:spcPts val="0"/>
+              </a:spcAft>
+              <a:buClr>
+                <a:schemeClr val="dk1"/>
+              </a:buClr>
+              <a:buSzPts val="1400"/>
+              <a:buNone/>
+            </a:pPr>
+            <a:r>
+              <a:t/>
+            </a:r>
+            <a:endParaRPr b="1" sz="1400"/>
+          </a:p>
+        </p:txBody>
+      </p:sp>
+      <p:cxnSp>
+        <p:nvCxnSpPr>
+          <p:cNvPr id="201" name="Google Shape;201;p33"/>
+          <p:cNvCxnSpPr/>
+          <p:nvPr/>
+        </p:nvCxnSpPr>
+        <p:spPr>
+          <a:xfrm>
+            <a:off x="510268" y="624569"/>
+            <a:ext cx="8274600" cy="0"/>
+          </a:xfrm>
+          <a:prstGeom prst="straightConnector1">
+            <a:avLst/>
+          </a:prstGeom>
+          <a:noFill/>
+          <a:ln cap="flat" cmpd="sng" w="12700">
+            <a:solidFill>
+              <a:srgbClr val="A5A5A5"/>
+            </a:solidFill>
+            <a:prstDash val="solid"/>
+            <a:miter lim="800000"/>
+            <a:headEnd len="sm" w="sm" type="none"/>
+            <a:tailEnd len="sm" w="sm" type="none"/>
+          </a:ln>
+        </p:spPr>
+      </p:cxnSp>
+      <p:cxnSp>
+        <p:nvCxnSpPr>
+          <p:cNvPr id="202" name="Google Shape;202;p33"/>
+          <p:cNvCxnSpPr/>
+          <p:nvPr/>
+        </p:nvCxnSpPr>
+        <p:spPr>
+          <a:xfrm>
+            <a:off x="510268" y="4788354"/>
+            <a:ext cx="8274600" cy="0"/>
+          </a:xfrm>
+          <a:prstGeom prst="straightConnector1">
+            <a:avLst/>
+          </a:prstGeom>
+          <a:noFill/>
+          <a:ln cap="flat" cmpd="sng" w="12700">
+            <a:solidFill>
+              <a:srgbClr val="A5A5A5"/>
+            </a:solidFill>
+            <a:prstDash val="solid"/>
+            <a:miter lim="800000"/>
+            <a:headEnd len="sm" w="sm" type="none"/>
+            <a:tailEnd len="sm" w="sm" type="none"/>
+          </a:ln>
+        </p:spPr>
+      </p:cxnSp>
+      <p:sp>
+        <p:nvSpPr>
+          <p:cNvPr id="203" name="Google Shape;203;p33"/>
           <p:cNvSpPr txBox="1"/>
           <p:nvPr/>
         </p:nvSpPr>
@@ -18138,6 +19844,285 @@
 </file>
 
 <file path=ppt/theme/theme1.xml><?xml version="1.0" encoding="utf-8"?>
+<a:theme xmlns:a="http://schemas.openxmlformats.org/drawingml/2006/main" xmlns:r="http://schemas.openxmlformats.org/officeDocument/2006/relationships" name="Office Theme">
+  <a:themeElements>
+    <a:clrScheme name="Office">
+      <a:dk1>
+        <a:srgbClr val="000000"/>
+      </a:dk1>
+      <a:lt1>
+        <a:srgbClr val="FFFFFF"/>
+      </a:lt1>
+      <a:dk2>
+        <a:srgbClr val="44546A"/>
+      </a:dk2>
+      <a:lt2>
+        <a:srgbClr val="E7E6E6"/>
+      </a:lt2>
+      <a:accent1>
+        <a:srgbClr val="4472C4"/>
+      </a:accent1>
+      <a:accent2>
+        <a:srgbClr val="ED7D31"/>
+      </a:accent2>
+      <a:accent3>
+        <a:srgbClr val="A5A5A5"/>
+      </a:accent3>
+      <a:accent4>
+        <a:srgbClr val="FFC000"/>
+      </a:accent4>
+      <a:accent5>
+        <a:srgbClr val="5B9BD5"/>
+      </a:accent5>
+      <a:accent6>
+        <a:srgbClr val="70AD47"/>
+      </a:accent6>
+      <a:hlink>
+        <a:srgbClr val="0563C1"/>
+      </a:hlink>
+      <a:folHlink>
+        <a:srgbClr val="954F72"/>
+      </a:folHlink>
+    </a:clrScheme>
+    <a:fontScheme name="Office">
+      <a:majorFont>
+        <a:latin typeface="Arial"/>
+        <a:ea typeface=""/>
+        <a:cs typeface=""/>
+        <a:font script="Jpan" typeface="ＭＳ Ｐゴシック"/>
+        <a:font script="Hang" typeface="맑은 고딕"/>
+        <a:font script="Hans" typeface="宋体"/>
+        <a:font script="Hant" typeface="新細明體"/>
+        <a:font script="Arab" typeface="Times New Roman"/>
+        <a:font script="Hebr" typeface="Times New Roman"/>
+        <a:font script="Thai" typeface="Angsana New"/>
+        <a:font script="Ethi" typeface="Nyala"/>
+        <a:font script="Beng" typeface="Vrinda"/>
+        <a:font script="Gujr" typeface="Shruti"/>
+        <a:font script="Khmr" typeface="MoolBoran"/>
+        <a:font script="Knda" typeface="Tunga"/>
+        <a:font script="Guru" typeface="Raavi"/>
+        <a:font script="Cans" typeface="Euphemia"/>
+        <a:font script="Cher" typeface="Plantagenet Cherokee"/>
+        <a:font script="Yiii" typeface="Microsoft Yi Baiti"/>
+        <a:font script="Tibt" typeface="Microsoft Himalaya"/>
+        <a:font script="Thaa" typeface="MV Boli"/>
+        <a:font script="Deva" typeface="Mangal"/>
+        <a:font script="Telu" typeface="Gautami"/>
+        <a:font script="Taml" typeface="Latha"/>
+        <a:font script="Syrc" typeface="Estrangelo Edessa"/>
+        <a:font script="Orya" typeface="Kalinga"/>
+        <a:font script="Mlym" typeface="Kartika"/>
+        <a:font script="Laoo" typeface="DokChampa"/>
+        <a:font script="Sinh" typeface="Iskoola Pota"/>
+        <a:font script="Mong" typeface="Mongolian Baiti"/>
+        <a:font script="Viet" typeface="Times New Roman"/>
+        <a:font script="Uigh" typeface="Microsoft Uighur"/>
+        <a:font script="Geor" typeface="Sylfaen"/>
+      </a:majorFont>
+      <a:minorFont>
+        <a:latin typeface="Arial"/>
+        <a:ea typeface=""/>
+        <a:cs typeface=""/>
+        <a:font script="Jpan" typeface="ＭＳ Ｐゴシック"/>
+        <a:font script="Hang" typeface="맑은 고딕"/>
+        <a:font script="Hans" typeface="宋体"/>
+        <a:font script="Hant" typeface="新細明體"/>
+        <a:font script="Arab" typeface="Arial"/>
+        <a:font script="Hebr" typeface="Arial"/>
+        <a:font script="Thai" typeface="Cordia New"/>
+        <a:font script="Ethi" typeface="Nyala"/>
+        <a:font script="Beng" typeface="Vrinda"/>
+        <a:font script="Gujr" typeface="Shruti"/>
+        <a:font script="Khmr" typeface="DaunPenh"/>
+        <a:font script="Knda" typeface="Tunga"/>
+        <a:font script="Guru" typeface="Raavi"/>
+        <a:font script="Cans" typeface="Euphemia"/>
+        <a:font script="Cher" typeface="Plantagenet Cherokee"/>
+        <a:font script="Yiii" typeface="Microsoft Yi Baiti"/>
+        <a:font script="Tibt" typeface="Microsoft Himalaya"/>
+        <a:font script="Thaa" typeface="MV Boli"/>
+        <a:font script="Deva" typeface="Mangal"/>
+        <a:font script="Telu" typeface="Gautami"/>
+        <a:font script="Taml" typeface="Latha"/>
+        <a:font script="Syrc" typeface="Estrangelo Edessa"/>
+        <a:font script="Orya" typeface="Kalinga"/>
+        <a:font script="Mlym" typeface="Kartika"/>
+        <a:font script="Laoo" typeface="DokChampa"/>
+        <a:font script="Sinh" typeface="Iskoola Pota"/>
+        <a:font script="Mong" typeface="Mongolian Baiti"/>
+        <a:font script="Viet" typeface="Arial"/>
+        <a:font script="Uigh" typeface="Microsoft Uighur"/>
+        <a:font script="Geor" typeface="Sylfaen"/>
+      </a:minorFont>
+    </a:fontScheme>
+    <a:fmtScheme name="Office">
+      <a:fillStyleLst>
+        <a:solidFill>
+          <a:schemeClr val="phClr"/>
+        </a:solidFill>
+        <a:gradFill rotWithShape="1">
+          <a:gsLst>
+            <a:gs pos="0">
+              <a:schemeClr val="phClr">
+                <a:tint val="50000"/>
+                <a:satMod val="300000"/>
+              </a:schemeClr>
+            </a:gs>
+            <a:gs pos="35000">
+              <a:schemeClr val="phClr">
+                <a:tint val="37000"/>
+                <a:satMod val="300000"/>
+              </a:schemeClr>
+            </a:gs>
+            <a:gs pos="100000">
+              <a:schemeClr val="phClr">
+                <a:tint val="15000"/>
+                <a:satMod val="350000"/>
+              </a:schemeClr>
+            </a:gs>
+          </a:gsLst>
+          <a:lin ang="16200000" scaled="1"/>
+        </a:gradFill>
+        <a:gradFill rotWithShape="1">
+          <a:gsLst>
+            <a:gs pos="0">
+              <a:schemeClr val="phClr">
+                <a:tint val="100000"/>
+                <a:shade val="100000"/>
+                <a:satMod val="130000"/>
+              </a:schemeClr>
+            </a:gs>
+            <a:gs pos="100000">
+              <a:schemeClr val="phClr">
+                <a:tint val="50000"/>
+                <a:shade val="100000"/>
+                <a:satMod val="350000"/>
+              </a:schemeClr>
+            </a:gs>
+          </a:gsLst>
+          <a:lin ang="16200000" scaled="0"/>
+        </a:gradFill>
+      </a:fillStyleLst>
+      <a:lnStyleLst>
+        <a:ln w="9525" cap="flat" cmpd="sng" algn="ctr">
+          <a:solidFill>
+            <a:schemeClr val="phClr">
+              <a:shade val="95000"/>
+              <a:satMod val="105000"/>
+            </a:schemeClr>
+          </a:solidFill>
+          <a:prstDash val="solid"/>
+        </a:ln>
+        <a:ln w="25400" cap="flat" cmpd="sng" algn="ctr">
+          <a:solidFill>
+            <a:schemeClr val="phClr"/>
+          </a:solidFill>
+          <a:prstDash val="solid"/>
+        </a:ln>
+        <a:ln w="38100" cap="flat" cmpd="sng" algn="ctr">
+          <a:solidFill>
+            <a:schemeClr val="phClr"/>
+          </a:solidFill>
+          <a:prstDash val="solid"/>
+        </a:ln>
+      </a:lnStyleLst>
+      <a:effectStyleLst>
+        <a:effectStyle>
+          <a:effectLst>
+            <a:outerShdw blurRad="40000" dist="20000" dir="5400000" rotWithShape="0">
+              <a:srgbClr val="000000">
+                <a:alpha val="38000"/>
+              </a:srgbClr>
+            </a:outerShdw>
+          </a:effectLst>
+        </a:effectStyle>
+        <a:effectStyle>
+          <a:effectLst>
+            <a:outerShdw blurRad="40000" dist="23000" dir="5400000" rotWithShape="0">
+              <a:srgbClr val="000000">
+                <a:alpha val="35000"/>
+              </a:srgbClr>
+            </a:outerShdw>
+          </a:effectLst>
+        </a:effectStyle>
+        <a:effectStyle>
+          <a:effectLst>
+            <a:outerShdw blurRad="40000" dist="23000" dir="5400000" rotWithShape="0">
+              <a:srgbClr val="000000">
+                <a:alpha val="35000"/>
+              </a:srgbClr>
+            </a:outerShdw>
+          </a:effectLst>
+          <a:scene3d>
+            <a:camera prst="orthographicFront">
+              <a:rot lat="0" lon="0" rev="0"/>
+            </a:camera>
+            <a:lightRig rig="threePt" dir="t">
+              <a:rot lat="0" lon="0" rev="1200000"/>
+            </a:lightRig>
+          </a:scene3d>
+          <a:sp3d>
+            <a:bevelT w="63500" h="25400"/>
+          </a:sp3d>
+        </a:effectStyle>
+      </a:effectStyleLst>
+      <a:bgFillStyleLst>
+        <a:solidFill>
+          <a:schemeClr val="phClr"/>
+        </a:solidFill>
+        <a:gradFill rotWithShape="1">
+          <a:gsLst>
+            <a:gs pos="0">
+              <a:schemeClr val="phClr">
+                <a:tint val="40000"/>
+                <a:satMod val="350000"/>
+              </a:schemeClr>
+            </a:gs>
+            <a:gs pos="40000">
+              <a:schemeClr val="phClr">
+                <a:tint val="45000"/>
+                <a:shade val="99000"/>
+                <a:satMod val="350000"/>
+              </a:schemeClr>
+            </a:gs>
+            <a:gs pos="100000">
+              <a:schemeClr val="phClr">
+                <a:shade val="20000"/>
+                <a:satMod val="255000"/>
+              </a:schemeClr>
+            </a:gs>
+          </a:gsLst>
+          <a:path path="circle">
+            <a:fillToRect l="50000" t="-80000" r="50000" b="180000"/>
+          </a:path>
+        </a:gradFill>
+        <a:gradFill rotWithShape="1">
+          <a:gsLst>
+            <a:gs pos="0">
+              <a:schemeClr val="phClr">
+                <a:tint val="80000"/>
+                <a:satMod val="300000"/>
+              </a:schemeClr>
+            </a:gs>
+            <a:gs pos="100000">
+              <a:schemeClr val="phClr">
+                <a:shade val="30000"/>
+                <a:satMod val="200000"/>
+              </a:schemeClr>
+            </a:gs>
+          </a:gsLst>
+          <a:path path="circle">
+            <a:fillToRect l="50000" t="50000" r="50000" b="50000"/>
+          </a:path>
+        </a:gradFill>
+      </a:bgFillStyleLst>
+    </a:fmtScheme>
+  </a:themeElements>
+</a:theme>
+</file>
+
+<file path=ppt/theme/theme2.xml><?xml version="1.0" encoding="utf-8"?>
 <a:theme xmlns:a="http://schemas.openxmlformats.org/drawingml/2006/main" xmlns:r="http://schemas.openxmlformats.org/officeDocument/2006/relationships">
   <a:themeElements>
     <a:clrScheme name="Default">
@@ -18416,7 +20401,7 @@
 </a:theme>
 </file>
 
-<file path=ppt/theme/theme2.xml><?xml version="1.0" encoding="utf-8"?>
+<file path=ppt/theme/theme3.xml><?xml version="1.0" encoding="utf-8"?>
 <a:theme xmlns:a="http://schemas.openxmlformats.org/drawingml/2006/main" xmlns:r="http://schemas.openxmlformats.org/officeDocument/2006/relationships" name="Simple Light">
   <a:themeElements>
     <a:clrScheme name="Simple Light">
@@ -18693,283 +20678,4 @@
     </a:fmtScheme>
   </a:themeElements>
 </a:theme>
-</file>
-
-<file path=ppt/theme/theme3.xml><?xml version="1.0" encoding="utf-8"?>
-<a:theme xmlns:a="http://schemas.openxmlformats.org/drawingml/2006/main" xmlns:r="http://schemas.openxmlformats.org/officeDocument/2006/relationships" name="Office Theme">
-  <a:themeElements>
-    <a:clrScheme name="Office">
-      <a:dk1>
-        <a:srgbClr val="000000"/>
-      </a:dk1>
-      <a:lt1>
-        <a:srgbClr val="FFFFFF"/>
-      </a:lt1>
-      <a:dk2>
-        <a:srgbClr val="44546A"/>
-      </a:dk2>
-      <a:lt2>
-        <a:srgbClr val="E7E6E6"/>
-      </a:lt2>
-      <a:accent1>
-        <a:srgbClr val="4472C4"/>
-      </a:accent1>
-      <a:accent2>
-        <a:srgbClr val="ED7D31"/>
-      </a:accent2>
-      <a:accent3>
-        <a:srgbClr val="A5A5A5"/>
-      </a:accent3>
-      <a:accent4>
-        <a:srgbClr val="FFC000"/>
-      </a:accent4>
-      <a:accent5>
-        <a:srgbClr val="5B9BD5"/>
-      </a:accent5>
-      <a:accent6>
-        <a:srgbClr val="70AD47"/>
-      </a:accent6>
-      <a:hlink>
-        <a:srgbClr val="0563C1"/>
-      </a:hlink>
-      <a:folHlink>
-        <a:srgbClr val="954F72"/>
-      </a:folHlink>
-    </a:clrScheme>
-    <a:fontScheme name="Office">
-      <a:majorFont>
-        <a:latin typeface="Arial"/>
-        <a:ea typeface=""/>
-        <a:cs typeface=""/>
-        <a:font script="Jpan" typeface="ＭＳ Ｐゴシック"/>
-        <a:font script="Hang" typeface="맑은 고딕"/>
-        <a:font script="Hans" typeface="宋体"/>
-        <a:font script="Hant" typeface="新細明體"/>
-        <a:font script="Arab" typeface="Times New Roman"/>
-        <a:font script="Hebr" typeface="Times New Roman"/>
-        <a:font script="Thai" typeface="Angsana New"/>
-        <a:font script="Ethi" typeface="Nyala"/>
-        <a:font script="Beng" typeface="Vrinda"/>
-        <a:font script="Gujr" typeface="Shruti"/>
-        <a:font script="Khmr" typeface="MoolBoran"/>
-        <a:font script="Knda" typeface="Tunga"/>
-        <a:font script="Guru" typeface="Raavi"/>
-        <a:font script="Cans" typeface="Euphemia"/>
-        <a:font script="Cher" typeface="Plantagenet Cherokee"/>
-        <a:font script="Yiii" typeface="Microsoft Yi Baiti"/>
-        <a:font script="Tibt" typeface="Microsoft Himalaya"/>
-        <a:font script="Thaa" typeface="MV Boli"/>
-        <a:font script="Deva" typeface="Mangal"/>
-        <a:font script="Telu" typeface="Gautami"/>
-        <a:font script="Taml" typeface="Latha"/>
-        <a:font script="Syrc" typeface="Estrangelo Edessa"/>
-        <a:font script="Orya" typeface="Kalinga"/>
-        <a:font script="Mlym" typeface="Kartika"/>
-        <a:font script="Laoo" typeface="DokChampa"/>
-        <a:font script="Sinh" typeface="Iskoola Pota"/>
-        <a:font script="Mong" typeface="Mongolian Baiti"/>
-        <a:font script="Viet" typeface="Times New Roman"/>
-        <a:font script="Uigh" typeface="Microsoft Uighur"/>
-        <a:font script="Geor" typeface="Sylfaen"/>
-      </a:majorFont>
-      <a:minorFont>
-        <a:latin typeface="Arial"/>
-        <a:ea typeface=""/>
-        <a:cs typeface=""/>
-        <a:font script="Jpan" typeface="ＭＳ Ｐゴシック"/>
-        <a:font script="Hang" typeface="맑은 고딕"/>
-        <a:font script="Hans" typeface="宋体"/>
-        <a:font script="Hant" typeface="新細明體"/>
-        <a:font script="Arab" typeface="Arial"/>
-        <a:font script="Hebr" typeface="Arial"/>
-        <a:font script="Thai" typeface="Cordia New"/>
-        <a:font script="Ethi" typeface="Nyala"/>
-        <a:font script="Beng" typeface="Vrinda"/>
-        <a:font script="Gujr" typeface="Shruti"/>
-        <a:font script="Khmr" typeface="DaunPenh"/>
-        <a:font script="Knda" typeface="Tunga"/>
-        <a:font script="Guru" typeface="Raavi"/>
-        <a:font script="Cans" typeface="Euphemia"/>
-        <a:font script="Cher" typeface="Plantagenet Cherokee"/>
-        <a:font script="Yiii" typeface="Microsoft Yi Baiti"/>
-        <a:font script="Tibt" typeface="Microsoft Himalaya"/>
-        <a:font script="Thaa" typeface="MV Boli"/>
-        <a:font script="Deva" typeface="Mangal"/>
-        <a:font script="Telu" typeface="Gautami"/>
-        <a:font script="Taml" typeface="Latha"/>
-        <a:font script="Syrc" typeface="Estrangelo Edessa"/>
-        <a:font script="Orya" typeface="Kalinga"/>
-        <a:font script="Mlym" typeface="Kartika"/>
-        <a:font script="Laoo" typeface="DokChampa"/>
-        <a:font script="Sinh" typeface="Iskoola Pota"/>
-        <a:font script="Mong" typeface="Mongolian Baiti"/>
-        <a:font script="Viet" typeface="Arial"/>
-        <a:font script="Uigh" typeface="Microsoft Uighur"/>
-        <a:font script="Geor" typeface="Sylfaen"/>
-      </a:minorFont>
-    </a:fontScheme>
-    <a:fmtScheme name="Office">
-      <a:fillStyleLst>
-        <a:solidFill>
-          <a:schemeClr val="phClr"/>
-        </a:solidFill>
-        <a:gradFill rotWithShape="1">
-          <a:gsLst>
-            <a:gs pos="0">
-              <a:schemeClr val="phClr">
-                <a:tint val="50000"/>
-                <a:satMod val="300000"/>
-              </a:schemeClr>
-            </a:gs>
-            <a:gs pos="35000">
-              <a:schemeClr val="phClr">
-                <a:tint val="37000"/>
-                <a:satMod val="300000"/>
-              </a:schemeClr>
-            </a:gs>
-            <a:gs pos="100000">
-              <a:schemeClr val="phClr">
-                <a:tint val="15000"/>
-                <a:satMod val="350000"/>
-              </a:schemeClr>
-            </a:gs>
-          </a:gsLst>
-          <a:lin ang="16200000" scaled="1"/>
-        </a:gradFill>
-        <a:gradFill rotWithShape="1">
-          <a:gsLst>
-            <a:gs pos="0">
-              <a:schemeClr val="phClr">
-                <a:tint val="100000"/>
-                <a:shade val="100000"/>
-                <a:satMod val="130000"/>
-              </a:schemeClr>
-            </a:gs>
-            <a:gs pos="100000">
-              <a:schemeClr val="phClr">
-                <a:tint val="50000"/>
-                <a:shade val="100000"/>
-                <a:satMod val="350000"/>
-              </a:schemeClr>
-            </a:gs>
-          </a:gsLst>
-          <a:lin ang="16200000" scaled="0"/>
-        </a:gradFill>
-      </a:fillStyleLst>
-      <a:lnStyleLst>
-        <a:ln w="9525" cap="flat" cmpd="sng" algn="ctr">
-          <a:solidFill>
-            <a:schemeClr val="phClr">
-              <a:shade val="95000"/>
-              <a:satMod val="105000"/>
-            </a:schemeClr>
-          </a:solidFill>
-          <a:prstDash val="solid"/>
-        </a:ln>
-        <a:ln w="25400" cap="flat" cmpd="sng" algn="ctr">
-          <a:solidFill>
-            <a:schemeClr val="phClr"/>
-          </a:solidFill>
-          <a:prstDash val="solid"/>
-        </a:ln>
-        <a:ln w="38100" cap="flat" cmpd="sng" algn="ctr">
-          <a:solidFill>
-            <a:schemeClr val="phClr"/>
-          </a:solidFill>
-          <a:prstDash val="solid"/>
-        </a:ln>
-      </a:lnStyleLst>
-      <a:effectStyleLst>
-        <a:effectStyle>
-          <a:effectLst>
-            <a:outerShdw blurRad="40000" dist="20000" dir="5400000" rotWithShape="0">
-              <a:srgbClr val="000000">
-                <a:alpha val="38000"/>
-              </a:srgbClr>
-            </a:outerShdw>
-          </a:effectLst>
-        </a:effectStyle>
-        <a:effectStyle>
-          <a:effectLst>
-            <a:outerShdw blurRad="40000" dist="23000" dir="5400000" rotWithShape="0">
-              <a:srgbClr val="000000">
-                <a:alpha val="35000"/>
-              </a:srgbClr>
-            </a:outerShdw>
-          </a:effectLst>
-        </a:effectStyle>
-        <a:effectStyle>
-          <a:effectLst>
-            <a:outerShdw blurRad="40000" dist="23000" dir="5400000" rotWithShape="0">
-              <a:srgbClr val="000000">
-                <a:alpha val="35000"/>
-              </a:srgbClr>
-            </a:outerShdw>
-          </a:effectLst>
-          <a:scene3d>
-            <a:camera prst="orthographicFront">
-              <a:rot lat="0" lon="0" rev="0"/>
-            </a:camera>
-            <a:lightRig rig="threePt" dir="t">
-              <a:rot lat="0" lon="0" rev="1200000"/>
-            </a:lightRig>
-          </a:scene3d>
-          <a:sp3d>
-            <a:bevelT w="63500" h="25400"/>
-          </a:sp3d>
-        </a:effectStyle>
-      </a:effectStyleLst>
-      <a:bgFillStyleLst>
-        <a:solidFill>
-          <a:schemeClr val="phClr"/>
-        </a:solidFill>
-        <a:gradFill rotWithShape="1">
-          <a:gsLst>
-            <a:gs pos="0">
-              <a:schemeClr val="phClr">
-                <a:tint val="40000"/>
-                <a:satMod val="350000"/>
-              </a:schemeClr>
-            </a:gs>
-            <a:gs pos="40000">
-              <a:schemeClr val="phClr">
-                <a:tint val="45000"/>
-                <a:shade val="99000"/>
-                <a:satMod val="350000"/>
-              </a:schemeClr>
-            </a:gs>
-            <a:gs pos="100000">
-              <a:schemeClr val="phClr">
-                <a:shade val="20000"/>
-                <a:satMod val="255000"/>
-              </a:schemeClr>
-            </a:gs>
-          </a:gsLst>
-          <a:path path="circle">
-            <a:fillToRect l="50000" t="-80000" r="50000" b="180000"/>
-          </a:path>
-        </a:gradFill>
-        <a:gradFill rotWithShape="1">
-          <a:gsLst>
-            <a:gs pos="0">
-              <a:schemeClr val="phClr">
-                <a:tint val="80000"/>
-                <a:satMod val="300000"/>
-              </a:schemeClr>
-            </a:gs>
-            <a:gs pos="100000">
-              <a:schemeClr val="phClr">
-                <a:shade val="30000"/>
-                <a:satMod val="200000"/>
-              </a:schemeClr>
-            </a:gs>
-          </a:gsLst>
-          <a:path path="circle">
-            <a:fillToRect l="50000" t="50000" r="50000" b="50000"/>
-          </a:path>
-        </a:gradFill>
-      </a:bgFillStyleLst>
-    </a:fmtScheme>
-  </a:themeElements>
-</a:theme>
 </file>
</xml_diff>